<commit_message>
add initial english support and refactor slides
</commit_message>
<xml_diff>
--- a/assets/slides/Semana2.pptx
+++ b/assets/slides/Semana2.pptx
@@ -5,38 +5,34 @@
     <p:sldMasterId id="2147483648" r:id="rId1"/>
   </p:sldMasterIdLst>
   <p:sldIdLst>
-    <p:sldId id="257" r:id="rId2"/>
-    <p:sldId id="283" r:id="rId3"/>
-    <p:sldId id="259" r:id="rId4"/>
-    <p:sldId id="272" r:id="rId5"/>
-    <p:sldId id="260" r:id="rId6"/>
-    <p:sldId id="270" r:id="rId7"/>
-    <p:sldId id="256" r:id="rId8"/>
-    <p:sldId id="281" r:id="rId9"/>
-    <p:sldId id="273" r:id="rId10"/>
-    <p:sldId id="279" r:id="rId11"/>
-    <p:sldId id="278" r:id="rId12"/>
-    <p:sldId id="274" r:id="rId13"/>
-    <p:sldId id="271" r:id="rId14"/>
-    <p:sldId id="284" r:id="rId15"/>
-    <p:sldId id="285" r:id="rId16"/>
-    <p:sldId id="276" r:id="rId17"/>
-    <p:sldId id="277" r:id="rId18"/>
-    <p:sldId id="262" r:id="rId19"/>
-    <p:sldId id="268" r:id="rId20"/>
-    <p:sldId id="282" r:id="rId21"/>
-    <p:sldId id="258" r:id="rId22"/>
-    <p:sldId id="280" r:id="rId23"/>
-    <p:sldId id="286" r:id="rId24"/>
-    <p:sldId id="269" r:id="rId25"/>
-    <p:sldId id="275" r:id="rId26"/>
-    <p:sldId id="267" r:id="rId27"/>
-    <p:sldId id="287" r:id="rId28"/>
-    <p:sldId id="288" r:id="rId29"/>
-    <p:sldId id="289" r:id="rId30"/>
-    <p:sldId id="290" r:id="rId31"/>
-    <p:sldId id="291" r:id="rId32"/>
-    <p:sldId id="292" r:id="rId33"/>
+    <p:sldId id="283" r:id="rId2"/>
+    <p:sldId id="259" r:id="rId3"/>
+    <p:sldId id="260" r:id="rId4"/>
+    <p:sldId id="270" r:id="rId5"/>
+    <p:sldId id="256" r:id="rId6"/>
+    <p:sldId id="281" r:id="rId7"/>
+    <p:sldId id="273" r:id="rId8"/>
+    <p:sldId id="279" r:id="rId9"/>
+    <p:sldId id="278" r:id="rId10"/>
+    <p:sldId id="274" r:id="rId11"/>
+    <p:sldId id="271" r:id="rId12"/>
+    <p:sldId id="284" r:id="rId13"/>
+    <p:sldId id="285" r:id="rId14"/>
+    <p:sldId id="276" r:id="rId15"/>
+    <p:sldId id="277" r:id="rId16"/>
+    <p:sldId id="262" r:id="rId17"/>
+    <p:sldId id="268" r:id="rId18"/>
+    <p:sldId id="282" r:id="rId19"/>
+    <p:sldId id="258" r:id="rId20"/>
+    <p:sldId id="280" r:id="rId21"/>
+    <p:sldId id="286" r:id="rId22"/>
+    <p:sldId id="267" r:id="rId23"/>
+    <p:sldId id="287" r:id="rId24"/>
+    <p:sldId id="288" r:id="rId25"/>
+    <p:sldId id="289" r:id="rId26"/>
+    <p:sldId id="290" r:id="rId27"/>
+    <p:sldId id="291" r:id="rId28"/>
+    <p:sldId id="292" r:id="rId29"/>
   </p:sldIdLst>
   <p:sldSz cx="12192000" cy="6858000"/>
   <p:notesSz cx="6858000" cy="9144000"/>
@@ -135,6 +131,11 @@
       </a:defRPr>
     </a:lvl9pPr>
   </p:defaultTextStyle>
+  <p:extLst>
+    <p:ext uri="{EFAFB233-063F-42B5-8137-9DF3F51BA10A}">
+      <p15:sldGuideLst xmlns:p15="http://schemas.microsoft.com/office/powerpoint/2012/main"/>
+    </p:ext>
+  </p:extLst>
 </p:presentation>
 </file>
 
@@ -287,7 +288,7 @@
           <a:p>
             <a:fld id="{5634A1B4-F01A-6D46-83CD-D63A950E1441}" type="datetimeFigureOut">
               <a:rPr lang="en-BR" smtClean="0"/>
-              <a:t>24/07/24</a:t>
+              <a:t>24/09/24</a:t>
             </a:fld>
             <a:endParaRPr lang="en-BR"/>
           </a:p>
@@ -487,7 +488,7 @@
           <a:p>
             <a:fld id="{5634A1B4-F01A-6D46-83CD-D63A950E1441}" type="datetimeFigureOut">
               <a:rPr lang="en-BR" smtClean="0"/>
-              <a:t>24/07/24</a:t>
+              <a:t>24/09/24</a:t>
             </a:fld>
             <a:endParaRPr lang="en-BR"/>
           </a:p>
@@ -697,7 +698,7 @@
           <a:p>
             <a:fld id="{5634A1B4-F01A-6D46-83CD-D63A950E1441}" type="datetimeFigureOut">
               <a:rPr lang="en-BR" smtClean="0"/>
-              <a:t>24/07/24</a:t>
+              <a:t>24/09/24</a:t>
             </a:fld>
             <a:endParaRPr lang="en-BR"/>
           </a:p>
@@ -897,7 +898,7 @@
           <a:p>
             <a:fld id="{5634A1B4-F01A-6D46-83CD-D63A950E1441}" type="datetimeFigureOut">
               <a:rPr lang="en-BR" smtClean="0"/>
-              <a:t>24/07/24</a:t>
+              <a:t>24/09/24</a:t>
             </a:fld>
             <a:endParaRPr lang="en-BR"/>
           </a:p>
@@ -1173,7 +1174,7 @@
           <a:p>
             <a:fld id="{5634A1B4-F01A-6D46-83CD-D63A950E1441}" type="datetimeFigureOut">
               <a:rPr lang="en-BR" smtClean="0"/>
-              <a:t>24/07/24</a:t>
+              <a:t>24/09/24</a:t>
             </a:fld>
             <a:endParaRPr lang="en-BR"/>
           </a:p>
@@ -1441,7 +1442,7 @@
           <a:p>
             <a:fld id="{5634A1B4-F01A-6D46-83CD-D63A950E1441}" type="datetimeFigureOut">
               <a:rPr lang="en-BR" smtClean="0"/>
-              <a:t>24/07/24</a:t>
+              <a:t>24/09/24</a:t>
             </a:fld>
             <a:endParaRPr lang="en-BR"/>
           </a:p>
@@ -1856,7 +1857,7 @@
           <a:p>
             <a:fld id="{5634A1B4-F01A-6D46-83CD-D63A950E1441}" type="datetimeFigureOut">
               <a:rPr lang="en-BR" smtClean="0"/>
-              <a:t>24/07/24</a:t>
+              <a:t>24/09/24</a:t>
             </a:fld>
             <a:endParaRPr lang="en-BR"/>
           </a:p>
@@ -1998,7 +1999,7 @@
           <a:p>
             <a:fld id="{5634A1B4-F01A-6D46-83CD-D63A950E1441}" type="datetimeFigureOut">
               <a:rPr lang="en-BR" smtClean="0"/>
-              <a:t>24/07/24</a:t>
+              <a:t>24/09/24</a:t>
             </a:fld>
             <a:endParaRPr lang="en-BR"/>
           </a:p>
@@ -2111,7 +2112,7 @@
           <a:p>
             <a:fld id="{5634A1B4-F01A-6D46-83CD-D63A950E1441}" type="datetimeFigureOut">
               <a:rPr lang="en-BR" smtClean="0"/>
-              <a:t>24/07/24</a:t>
+              <a:t>24/09/24</a:t>
             </a:fld>
             <a:endParaRPr lang="en-BR"/>
           </a:p>
@@ -2424,7 +2425,7 @@
           <a:p>
             <a:fld id="{5634A1B4-F01A-6D46-83CD-D63A950E1441}" type="datetimeFigureOut">
               <a:rPr lang="en-BR" smtClean="0"/>
-              <a:t>24/07/24</a:t>
+              <a:t>24/09/24</a:t>
             </a:fld>
             <a:endParaRPr lang="en-BR"/>
           </a:p>
@@ -2713,7 +2714,7 @@
           <a:p>
             <a:fld id="{5634A1B4-F01A-6D46-83CD-D63A950E1441}" type="datetimeFigureOut">
               <a:rPr lang="en-BR" smtClean="0"/>
-              <a:t>24/07/24</a:t>
+              <a:t>24/09/24</a:t>
             </a:fld>
             <a:endParaRPr lang="en-BR"/>
           </a:p>
@@ -2956,7 +2957,7 @@
           <a:p>
             <a:fld id="{5634A1B4-F01A-6D46-83CD-D63A950E1441}" type="datetimeFigureOut">
               <a:rPr lang="en-BR" smtClean="0"/>
-              <a:t>24/07/24</a:t>
+              <a:t>24/09/24</a:t>
             </a:fld>
             <a:endParaRPr lang="en-BR"/>
           </a:p>
@@ -3359,314 +3360,6 @@
 <file path=ppt/slides/slide1.xml><?xml version="1.0" encoding="utf-8"?>
 <p:sld xmlns:a="http://schemas.openxmlformats.org/drawingml/2006/main" xmlns:r="http://schemas.openxmlformats.org/officeDocument/2006/relationships" xmlns:p="http://schemas.openxmlformats.org/presentationml/2006/main">
   <p:cSld>
-    <p:spTree>
-      <p:nvGrpSpPr>
-        <p:cNvPr id="1" name=""/>
-        <p:cNvGrpSpPr/>
-        <p:nvPr/>
-      </p:nvGrpSpPr>
-      <p:grpSpPr>
-        <a:xfrm>
-          <a:off x="0" y="0"/>
-          <a:ext cx="0" cy="0"/>
-          <a:chOff x="0" y="0"/>
-          <a:chExt cx="0" cy="0"/>
-        </a:xfrm>
-      </p:grpSpPr>
-      <p:sp>
-        <p:nvSpPr>
-          <p:cNvPr id="2" name="Title 1">
-            <a:extLst>
-              <a:ext uri="{FF2B5EF4-FFF2-40B4-BE49-F238E27FC236}">
-                <a16:creationId xmlns:a16="http://schemas.microsoft.com/office/drawing/2014/main" id="{154CA41F-BB8A-925C-CC3D-4657E9046B42}"/>
-              </a:ext>
-            </a:extLst>
-          </p:cNvPr>
-          <p:cNvSpPr>
-            <a:spLocks noGrp="1"/>
-          </p:cNvSpPr>
-          <p:nvPr>
-            <p:ph type="title"/>
-          </p:nvPr>
-        </p:nvSpPr>
-        <p:spPr/>
-        <p:txBody>
-          <a:bodyPr/>
-          <a:lstStyle/>
-          <a:p>
-            <a:r>
-              <a:rPr lang="en-BR" dirty="0"/>
-              <a:t>Semana 2 – Planejamento	</a:t>
-            </a:r>
-          </a:p>
-        </p:txBody>
-      </p:sp>
-      <p:sp>
-        <p:nvSpPr>
-          <p:cNvPr id="3" name="Content Placeholder 2">
-            <a:extLst>
-              <a:ext uri="{FF2B5EF4-FFF2-40B4-BE49-F238E27FC236}">
-                <a16:creationId xmlns:a16="http://schemas.microsoft.com/office/drawing/2014/main" id="{6EA982C9-9CF1-4088-343E-E6178D92A818}"/>
-              </a:ext>
-            </a:extLst>
-          </p:cNvPr>
-          <p:cNvSpPr>
-            <a:spLocks noGrp="1"/>
-          </p:cNvSpPr>
-          <p:nvPr>
-            <p:ph idx="1"/>
-          </p:nvPr>
-        </p:nvSpPr>
-        <p:spPr>
-          <a:xfrm>
-            <a:off x="848958" y="1825625"/>
-            <a:ext cx="10758842" cy="4101042"/>
-          </a:xfrm>
-        </p:spPr>
-        <p:txBody>
-          <a:bodyPr>
-            <a:normAutofit fontScale="85000" lnSpcReduction="10000"/>
-          </a:bodyPr>
-          <a:lstStyle/>
-          <a:p>
-            <a:pPr>
-              <a:buFontTx/>
-              <a:buChar char="-"/>
-            </a:pPr>
-            <a:r>
-              <a:rPr lang="en-BR" dirty="0"/>
-              <a:t>Conceitos importantes para revisar (15 min)</a:t>
-            </a:r>
-          </a:p>
-          <a:p>
-            <a:pPr>
-              <a:buFontTx/>
-              <a:buChar char="-"/>
-            </a:pPr>
-            <a:endParaRPr lang="en-BR" dirty="0"/>
-          </a:p>
-          <a:p>
-            <a:pPr>
-              <a:buFontTx/>
-              <a:buChar char="-"/>
-            </a:pPr>
-            <a:r>
-              <a:rPr lang="en-BR" dirty="0"/>
-              <a:t>Prática Parte 1: Lab (simulearn) para demonstração dos conceitos (15 min)</a:t>
-            </a:r>
-          </a:p>
-          <a:p>
-            <a:pPr>
-              <a:buFontTx/>
-              <a:buChar char="-"/>
-            </a:pPr>
-            <a:endParaRPr lang="en-BR" dirty="0"/>
-          </a:p>
-          <a:p>
-            <a:pPr>
-              <a:buFontTx/>
-              <a:buChar char="-"/>
-            </a:pPr>
-            <a:r>
-              <a:rPr lang="en-BR" dirty="0"/>
-              <a:t>Prática Parte 2: DIY -&gt; Todos farão um lab (simulearn) para ver como funciona (10 min)</a:t>
-            </a:r>
-          </a:p>
-          <a:p>
-            <a:pPr>
-              <a:buFontTx/>
-              <a:buChar char="-"/>
-            </a:pPr>
-            <a:endParaRPr lang="en-BR" dirty="0"/>
-          </a:p>
-          <a:p>
-            <a:pPr>
-              <a:buFontTx/>
-              <a:buChar char="-"/>
-            </a:pPr>
-            <a:r>
-              <a:rPr lang="en-BR" dirty="0"/>
-              <a:t>Resolução de exercícios com conceitos chave (10 min)</a:t>
-            </a:r>
-          </a:p>
-          <a:p>
-            <a:pPr>
-              <a:buFontTx/>
-              <a:buChar char="-"/>
-            </a:pPr>
-            <a:endParaRPr lang="en-BR" dirty="0"/>
-          </a:p>
-          <a:p>
-            <a:pPr>
-              <a:buFontTx/>
-              <a:buChar char="-"/>
-            </a:pPr>
-            <a:r>
-              <a:rPr lang="en-BR" dirty="0"/>
-              <a:t>Dúvidas podem ser levantadas a qualquer momento</a:t>
-            </a:r>
-          </a:p>
-        </p:txBody>
-      </p:sp>
-    </p:spTree>
-    <p:extLst>
-      <p:ext uri="{BB962C8B-B14F-4D97-AF65-F5344CB8AC3E}">
-        <p14:creationId xmlns:p14="http://schemas.microsoft.com/office/powerpoint/2010/main" val="3033544374"/>
-      </p:ext>
-    </p:extLst>
-  </p:cSld>
-  <p:clrMapOvr>
-    <a:masterClrMapping/>
-  </p:clrMapOvr>
-</p:sld>
-</file>
-
-<file path=ppt/slides/slide10.xml><?xml version="1.0" encoding="utf-8"?>
-<p:sld xmlns:a="http://schemas.openxmlformats.org/drawingml/2006/main" xmlns:r="http://schemas.openxmlformats.org/officeDocument/2006/relationships" xmlns:p="http://schemas.openxmlformats.org/presentationml/2006/main">
-  <p:cSld>
-    <p:spTree>
-      <p:nvGrpSpPr>
-        <p:cNvPr id="1" name=""/>
-        <p:cNvGrpSpPr/>
-        <p:nvPr/>
-      </p:nvGrpSpPr>
-      <p:grpSpPr>
-        <a:xfrm>
-          <a:off x="0" y="0"/>
-          <a:ext cx="0" cy="0"/>
-          <a:chOff x="0" y="0"/>
-          <a:chExt cx="0" cy="0"/>
-        </a:xfrm>
-      </p:grpSpPr>
-      <p:sp>
-        <p:nvSpPr>
-          <p:cNvPr id="2" name="Title 1">
-            <a:extLst>
-              <a:ext uri="{FF2B5EF4-FFF2-40B4-BE49-F238E27FC236}">
-                <a16:creationId xmlns:a16="http://schemas.microsoft.com/office/drawing/2014/main" id="{BA741BC6-744E-7992-B0F0-AB1FE5463C39}"/>
-              </a:ext>
-            </a:extLst>
-          </p:cNvPr>
-          <p:cNvSpPr>
-            <a:spLocks noGrp="1"/>
-          </p:cNvSpPr>
-          <p:nvPr>
-            <p:ph type="ctrTitle"/>
-          </p:nvPr>
-        </p:nvSpPr>
-        <p:spPr>
-          <a:xfrm>
-            <a:off x="2220559" y="0"/>
-            <a:ext cx="7493599" cy="887021"/>
-          </a:xfrm>
-        </p:spPr>
-        <p:txBody>
-          <a:bodyPr>
-            <a:normAutofit/>
-          </a:bodyPr>
-          <a:lstStyle/>
-          <a:p>
-            <a:r>
-              <a:rPr lang="en-BR" sz="2000" dirty="0"/>
-              <a:t>IAM: Identity Access Management</a:t>
-            </a:r>
-            <a:br>
-              <a:rPr lang="en-BR" sz="2000" dirty="0"/>
-            </a:br>
-            <a:endParaRPr lang="en-BR" sz="2000" dirty="0"/>
-          </a:p>
-        </p:txBody>
-      </p:sp>
-      <p:sp>
-        <p:nvSpPr>
-          <p:cNvPr id="4" name="TextBox 3">
-            <a:extLst>
-              <a:ext uri="{FF2B5EF4-FFF2-40B4-BE49-F238E27FC236}">
-                <a16:creationId xmlns:a16="http://schemas.microsoft.com/office/drawing/2014/main" id="{E0A560F6-07C1-E681-AC8E-05F3244D6E06}"/>
-              </a:ext>
-            </a:extLst>
-          </p:cNvPr>
-          <p:cNvSpPr txBox="1"/>
-          <p:nvPr/>
-        </p:nvSpPr>
-        <p:spPr>
-          <a:xfrm>
-            <a:off x="3833137" y="873339"/>
-            <a:ext cx="3938642" cy="369332"/>
-          </a:xfrm>
-          <a:prstGeom prst="rect">
-            <a:avLst/>
-          </a:prstGeom>
-          <a:noFill/>
-        </p:spPr>
-        <p:txBody>
-          <a:bodyPr wrap="none" rtlCol="0">
-            <a:spAutoFit/>
-          </a:bodyPr>
-          <a:lstStyle/>
-          <a:p>
-            <a:pPr marL="285750" indent="-285750">
-              <a:buFontTx/>
-              <a:buChar char="-"/>
-            </a:pPr>
-            <a:r>
-              <a:rPr lang="en-BR" dirty="0"/>
-              <a:t>Estrututura básica de uma </a:t>
-            </a:r>
-            <a:r>
-              <a:rPr lang="en-BR" b="1" dirty="0"/>
-              <a:t>política</a:t>
-            </a:r>
-            <a:endParaRPr lang="en-BR" dirty="0"/>
-          </a:p>
-        </p:txBody>
-      </p:sp>
-      <p:pic>
-        <p:nvPicPr>
-          <p:cNvPr id="5" name="Picture 4">
-            <a:extLst>
-              <a:ext uri="{FF2B5EF4-FFF2-40B4-BE49-F238E27FC236}">
-                <a16:creationId xmlns:a16="http://schemas.microsoft.com/office/drawing/2014/main" id="{13B5A30C-BF88-BD81-0051-AD1CBFD529CC}"/>
-              </a:ext>
-            </a:extLst>
-          </p:cNvPr>
-          <p:cNvPicPr>
-            <a:picLocks noChangeAspect="1"/>
-          </p:cNvPicPr>
-          <p:nvPr/>
-        </p:nvPicPr>
-        <p:blipFill>
-          <a:blip r:embed="rId2"/>
-          <a:stretch>
-            <a:fillRect/>
-          </a:stretch>
-        </p:blipFill>
-        <p:spPr>
-          <a:xfrm>
-            <a:off x="2551058" y="1616090"/>
-            <a:ext cx="6832600" cy="5004157"/>
-          </a:xfrm>
-          <a:prstGeom prst="rect">
-            <a:avLst/>
-          </a:prstGeom>
-        </p:spPr>
-      </p:pic>
-    </p:spTree>
-    <p:extLst>
-      <p:ext uri="{BB962C8B-B14F-4D97-AF65-F5344CB8AC3E}">
-        <p14:creationId xmlns:p14="http://schemas.microsoft.com/office/powerpoint/2010/main" val="1628246712"/>
-      </p:ext>
-    </p:extLst>
-  </p:cSld>
-  <p:clrMapOvr>
-    <a:masterClrMapping/>
-  </p:clrMapOvr>
-</p:sld>
-</file>
-
-<file path=ppt/slides/slide11.xml><?xml version="1.0" encoding="utf-8"?>
-<p:sld xmlns:a="http://schemas.openxmlformats.org/drawingml/2006/main" xmlns:r="http://schemas.openxmlformats.org/officeDocument/2006/relationships" xmlns:p="http://schemas.openxmlformats.org/presentationml/2006/main">
-  <p:cSld>
     <p:bg>
       <p:bgPr>
         <a:solidFill>
@@ -3689,12 +3382,12 @@
           <a:chExt cx="0" cy="0"/>
         </a:xfrm>
       </p:grpSpPr>
-      <p:sp useBgFill="1">
+      <p:sp>
         <p:nvSpPr>
-          <p:cNvPr id="29" name="Rectangle 28">
+          <p:cNvPr id="9" name="Down Arrow 7">
             <a:extLst>
               <a:ext uri="{FF2B5EF4-FFF2-40B4-BE49-F238E27FC236}">
-                <a16:creationId xmlns:a16="http://schemas.microsoft.com/office/drawing/2014/main" id="{53B021B3-DE93-4AB7-8A18-CF5F1CED88B8}"/>
+                <a16:creationId xmlns:a16="http://schemas.microsoft.com/office/drawing/2014/main" id="{D4771268-CB57-404A-9271-370EB28F6090}"/>
               </a:ext>
               <a:ext uri="{C183D7F6-B498-43B3-948B-1728B52AA6E4}">
                 <adec:decorative xmlns:adec="http://schemas.microsoft.com/office/drawing/2017/decorative" val="1"/>
@@ -3713,14 +3406,20 @@
           </p:nvPr>
         </p:nvSpPr>
         <p:spPr>
-          <a:xfrm>
-            <a:off x="0" y="0"/>
-            <a:ext cx="12192000" cy="6858000"/>
+          <a:xfrm rot="16200000">
+            <a:off x="800100" y="1491343"/>
+            <a:ext cx="3333749" cy="3499103"/>
           </a:xfrm>
-          <a:prstGeom prst="rect">
-            <a:avLst/>
+          <a:prstGeom prst="downArrow">
+            <a:avLst>
+              <a:gd name="adj1" fmla="val 100000"/>
+              <a:gd name="adj2" fmla="val 15788"/>
+            </a:avLst>
           </a:prstGeom>
-          <a:ln>
+          <a:solidFill>
+            <a:srgbClr val="404040"/>
+          </a:solidFill>
+          <a:ln w="53975">
             <a:noFill/>
           </a:ln>
         </p:spPr>
@@ -3754,7 +3453,7 @@
           <p:cNvPr id="2" name="Title 1">
             <a:extLst>
               <a:ext uri="{FF2B5EF4-FFF2-40B4-BE49-F238E27FC236}">
-                <a16:creationId xmlns:a16="http://schemas.microsoft.com/office/drawing/2014/main" id="{BA741BC6-744E-7992-B0F0-AB1FE5463C39}"/>
+                <a16:creationId xmlns:a16="http://schemas.microsoft.com/office/drawing/2014/main" id="{154CA41F-BB8A-925C-CC3D-4657E9046B42}"/>
               </a:ext>
             </a:extLst>
           </p:cNvPr>
@@ -3762,200 +3461,76 @@
             <a:spLocks noGrp="1"/>
           </p:cNvSpPr>
           <p:nvPr>
-            <p:ph type="ctrTitle"/>
+            <p:ph type="title"/>
           </p:nvPr>
         </p:nvSpPr>
         <p:spPr>
           <a:xfrm>
-            <a:off x="841248" y="256032"/>
-            <a:ext cx="10506456" cy="1014984"/>
+            <a:off x="1028700" y="1967266"/>
+            <a:ext cx="2628900" cy="2547257"/>
           </a:xfrm>
+          <a:noFill/>
         </p:spPr>
         <p:txBody>
-          <a:bodyPr vert="horz" lIns="91440" tIns="45720" rIns="91440" bIns="45720" rtlCol="0" anchor="b">
+          <a:bodyPr vert="horz" lIns="91440" tIns="45720" rIns="91440" bIns="45720" rtlCol="0" anchor="ctr">
             <a:normAutofit/>
           </a:bodyPr>
           <a:lstStyle/>
           <a:p>
-            <a:pPr algn="l"/>
-            <a:r>
-              <a:rPr lang="en-US" sz="3100" kern="1200">
-                <a:solidFill>
-                  <a:schemeClr val="tx1"/>
+            <a:pPr algn="ctr"/>
+            <a:r>
+              <a:rPr lang="en-US" sz="3600" kern="1200" dirty="0" err="1">
+                <a:solidFill>
+                  <a:srgbClr val="FFFFFF"/>
                 </a:solidFill>
                 <a:latin typeface="+mj-lt"/>
                 <a:ea typeface="+mj-ea"/>
                 <a:cs typeface="+mj-cs"/>
               </a:rPr>
-              <a:t>IAM: Identity Access Management</a:t>
-            </a:r>
-            <a:br>
-              <a:rPr lang="en-US" sz="3100" kern="1200">
-                <a:solidFill>
-                  <a:schemeClr val="tx1"/>
+              <a:t>Parte</a:t>
+            </a:r>
+            <a:r>
+              <a:rPr lang="en-US" sz="3600" kern="1200" dirty="0">
+                <a:solidFill>
+                  <a:srgbClr val="FFFFFF"/>
                 </a:solidFill>
                 <a:latin typeface="+mj-lt"/>
                 <a:ea typeface="+mj-ea"/>
                 <a:cs typeface="+mj-cs"/>
               </a:rPr>
-            </a:br>
-            <a:r>
-              <a:rPr lang="en-US" sz="3100" kern="1200">
-                <a:solidFill>
-                  <a:schemeClr val="tx1"/>
+              <a:t> 2 – Ponto de </a:t>
+            </a:r>
+            <a:r>
+              <a:rPr lang="en-US" sz="3600" kern="1200" dirty="0" err="1">
+                <a:solidFill>
+                  <a:srgbClr val="FFFFFF"/>
                 </a:solidFill>
                 <a:latin typeface="+mj-lt"/>
                 <a:ea typeface="+mj-ea"/>
                 <a:cs typeface="+mj-cs"/>
               </a:rPr>
-              <a:t>Policy Documents:</a:t>
-            </a:r>
-          </a:p>
-        </p:txBody>
-      </p:sp>
-      <p:sp>
-        <p:nvSpPr>
-          <p:cNvPr id="30" name="Rectangle 29">
-            <a:extLst>
-              <a:ext uri="{FF2B5EF4-FFF2-40B4-BE49-F238E27FC236}">
-                <a16:creationId xmlns:a16="http://schemas.microsoft.com/office/drawing/2014/main" id="{52D502E5-F6B4-4D58-B4AE-FC466FF15EE8}"/>
-              </a:ext>
-              <a:ext uri="{C183D7F6-B498-43B3-948B-1728B52AA6E4}">
-                <adec:decorative xmlns:adec="http://schemas.microsoft.com/office/drawing/2017/decorative" val="1"/>
-              </a:ext>
-            </a:extLst>
-          </p:cNvPr>
-          <p:cNvSpPr>
-            <a:spLocks noGrp="1" noRot="1" noChangeAspect="1" noMove="1" noResize="1" noEditPoints="1" noAdjustHandles="1" noChangeArrowheads="1" noChangeShapeType="1" noTextEdit="1"/>
-          </p:cNvSpPr>
-          <p:nvPr>
-            <p:extLst>
-              <p:ext uri="{386F3935-93C4-4BCD-93E2-E3B085C9AB24}">
-                <p16:designElem xmlns:p16="http://schemas.microsoft.com/office/powerpoint/2015/main" val="1"/>
-              </p:ext>
-            </p:extLst>
-          </p:nvPr>
-        </p:nvSpPr>
-        <p:spPr>
-          <a:xfrm>
-            <a:off x="865953" y="1634502"/>
-            <a:ext cx="10451592" cy="18288"/>
-          </a:xfrm>
-          <a:prstGeom prst="rect">
-            <a:avLst/>
-          </a:prstGeom>
-          <a:solidFill>
-            <a:srgbClr val="D5D5D5"/>
-          </a:solidFill>
-          <a:ln w="3175">
-            <a:noFill/>
-          </a:ln>
-          <a:effectLst/>
-        </p:spPr>
-        <p:style>
-          <a:lnRef idx="2">
-            <a:schemeClr val="accent1">
-              <a:shade val="50000"/>
-            </a:schemeClr>
-          </a:lnRef>
-          <a:fillRef idx="1">
-            <a:schemeClr val="accent1"/>
-          </a:fillRef>
-          <a:effectRef idx="0">
-            <a:schemeClr val="accent1"/>
-          </a:effectRef>
-          <a:fontRef idx="minor">
-            <a:schemeClr val="lt1"/>
-          </a:fontRef>
-        </p:style>
-        <p:txBody>
-          <a:bodyPr rtlCol="0" anchor="ctr"/>
-          <a:lstStyle/>
-          <a:p>
-            <a:pPr algn="ctr"/>
-            <a:endParaRPr lang="en-US">
-              <a:solidFill>
-                <a:prstClr val="white"/>
-              </a:solidFill>
-              <a:latin typeface="Calibri" panose="020F0502020204030204"/>
-            </a:endParaRPr>
-          </a:p>
-        </p:txBody>
-      </p:sp>
-      <p:sp>
-        <p:nvSpPr>
-          <p:cNvPr id="31" name="Rectangle 30">
-            <a:extLst>
-              <a:ext uri="{FF2B5EF4-FFF2-40B4-BE49-F238E27FC236}">
-                <a16:creationId xmlns:a16="http://schemas.microsoft.com/office/drawing/2014/main" id="{9DECDBF4-02B6-4BB4-B65B-B8107AD6A9E8}"/>
-              </a:ext>
-              <a:ext uri="{C183D7F6-B498-43B3-948B-1728B52AA6E4}">
-                <adec:decorative xmlns:adec="http://schemas.microsoft.com/office/drawing/2017/decorative" val="1"/>
-              </a:ext>
-            </a:extLst>
-          </p:cNvPr>
-          <p:cNvSpPr>
-            <a:spLocks noGrp="1" noRot="1" noChangeAspect="1" noMove="1" noResize="1" noEditPoints="1" noAdjustHandles="1" noChangeArrowheads="1" noChangeShapeType="1" noTextEdit="1"/>
-          </p:cNvSpPr>
-          <p:nvPr>
-            <p:extLst>
-              <p:ext uri="{386F3935-93C4-4BCD-93E2-E3B085C9AB24}">
-                <p16:designElem xmlns:p16="http://schemas.microsoft.com/office/powerpoint/2015/main" val="1"/>
-              </p:ext>
-            </p:extLst>
-          </p:nvPr>
-        </p:nvSpPr>
-        <p:spPr>
-          <a:xfrm flipV="1">
-            <a:off x="841248" y="1538176"/>
-            <a:ext cx="1873457" cy="109814"/>
-          </a:xfrm>
-          <a:prstGeom prst="rect">
-            <a:avLst/>
-          </a:prstGeom>
-          <a:solidFill>
-            <a:schemeClr val="accent2"/>
-          </a:solidFill>
-          <a:ln>
-            <a:noFill/>
-          </a:ln>
-        </p:spPr>
-        <p:style>
-          <a:lnRef idx="2">
-            <a:schemeClr val="accent1">
-              <a:shade val="50000"/>
-            </a:schemeClr>
-          </a:lnRef>
-          <a:fillRef idx="1">
-            <a:schemeClr val="accent1"/>
-          </a:fillRef>
-          <a:effectRef idx="0">
-            <a:schemeClr val="accent1"/>
-          </a:effectRef>
-          <a:fontRef idx="minor">
-            <a:schemeClr val="lt1"/>
-          </a:fontRef>
-        </p:style>
-        <p:txBody>
-          <a:bodyPr rtlCol="0" anchor="ctr"/>
-          <a:lstStyle/>
-          <a:p>
-            <a:pPr algn="ctr"/>
-            <a:endParaRPr lang="en-US">
-              <a:solidFill>
-                <a:prstClr val="white"/>
-              </a:solidFill>
-              <a:latin typeface="Calibri" panose="020F0502020204030204"/>
-            </a:endParaRPr>
+              <a:t>partida</a:t>
+            </a:r>
+            <a:r>
+              <a:rPr lang="en-US" sz="3600" kern="1200" dirty="0">
+                <a:solidFill>
+                  <a:srgbClr val="FFFFFF"/>
+                </a:solidFill>
+                <a:latin typeface="+mj-lt"/>
+                <a:ea typeface="+mj-ea"/>
+                <a:cs typeface="+mj-cs"/>
+              </a:rPr>
+              <a:t>	</a:t>
+            </a:r>
           </a:p>
         </p:txBody>
       </p:sp>
       <p:pic>
         <p:nvPicPr>
-          <p:cNvPr id="5" name="Picture 4" descr="A red square with a white line on it&#10;&#10;Description automatically generated">
+          <p:cNvPr id="4" name="Picture 3" descr="A document with text on it&#10;&#10;Description automatically generated">
             <a:extLst>
               <a:ext uri="{FF2B5EF4-FFF2-40B4-BE49-F238E27FC236}">
-                <a16:creationId xmlns:a16="http://schemas.microsoft.com/office/drawing/2014/main" id="{38DDF2EB-C63B-7284-7F86-33B82E3D9E82}"/>
+                <a16:creationId xmlns:a16="http://schemas.microsoft.com/office/drawing/2014/main" id="{94A50622-FDA3-EF07-CCD5-202B1CF1E6BA}"/>
               </a:ext>
             </a:extLst>
           </p:cNvPr>
@@ -3972,427 +3547,8 @@
         </p:blipFill>
         <p:spPr>
           <a:xfrm>
-            <a:off x="5325439" y="2030990"/>
-            <a:ext cx="972050" cy="965655"/>
-          </a:xfrm>
-          <a:prstGeom prst="rect">
-            <a:avLst/>
-          </a:prstGeom>
-        </p:spPr>
-      </p:pic>
-      <p:sp>
-        <p:nvSpPr>
-          <p:cNvPr id="6" name="Rounded Rectangle 5">
-            <a:extLst>
-              <a:ext uri="{FF2B5EF4-FFF2-40B4-BE49-F238E27FC236}">
-                <a16:creationId xmlns:a16="http://schemas.microsoft.com/office/drawing/2014/main" id="{F7748687-CA60-F5D3-F4DD-8B31589C700E}"/>
-              </a:ext>
-            </a:extLst>
-          </p:cNvPr>
-          <p:cNvSpPr/>
-          <p:nvPr/>
-        </p:nvSpPr>
-        <p:spPr>
-          <a:xfrm>
-            <a:off x="107779" y="2049666"/>
-            <a:ext cx="4636546" cy="928303"/>
-          </a:xfrm>
-          <a:prstGeom prst="roundRect">
-            <a:avLst/>
-          </a:prstGeom>
-        </p:spPr>
-        <p:style>
-          <a:lnRef idx="2">
-            <a:schemeClr val="accent1">
-              <a:shade val="15000"/>
-            </a:schemeClr>
-          </a:lnRef>
-          <a:fillRef idx="1">
-            <a:schemeClr val="accent1"/>
-          </a:fillRef>
-          <a:effectRef idx="0">
-            <a:schemeClr val="accent1"/>
-          </a:effectRef>
-          <a:fontRef idx="minor">
-            <a:schemeClr val="lt1"/>
-          </a:fontRef>
-        </p:style>
-        <p:txBody>
-          <a:bodyPr rtlCol="0" anchor="ctr"/>
-          <a:lstStyle/>
-          <a:p>
-            <a:pPr algn="ctr" defTabSz="877824">
-              <a:spcAft>
-                <a:spcPts val="600"/>
-              </a:spcAft>
-            </a:pPr>
-            <a:r>
-              <a:rPr lang="en-BR" sz="1728" kern="1200" dirty="0">
-                <a:solidFill>
-                  <a:schemeClr val="bg1"/>
-                </a:solidFill>
-                <a:latin typeface="+mn-lt"/>
-                <a:ea typeface="+mn-ea"/>
-                <a:cs typeface="+mn-cs"/>
-              </a:rPr>
-              <a:t>Identity based:</a:t>
-            </a:r>
-          </a:p>
-          <a:p>
-            <a:pPr algn="ctr" defTabSz="877824">
-              <a:spcAft>
-                <a:spcPts val="600"/>
-              </a:spcAft>
-            </a:pPr>
-            <a:r>
-              <a:rPr lang="en-US" sz="1728" kern="1200" dirty="0">
-                <a:solidFill>
-                  <a:schemeClr val="bg1"/>
-                </a:solidFill>
-                <a:latin typeface="+mn-lt"/>
-                <a:ea typeface="+mn-ea"/>
-                <a:cs typeface="+mn-cs"/>
-              </a:rPr>
-              <a:t>Permissões de U</a:t>
-            </a:r>
-            <a:r>
-              <a:rPr lang="en-BR" sz="1728" kern="1200" dirty="0">
-                <a:solidFill>
-                  <a:schemeClr val="bg1"/>
-                </a:solidFill>
-                <a:latin typeface="+mn-lt"/>
-                <a:ea typeface="+mn-ea"/>
-                <a:cs typeface="+mn-cs"/>
-              </a:rPr>
-              <a:t>ser ou Role (role pode ser resource based)</a:t>
-            </a:r>
-            <a:endParaRPr lang="en-BR" dirty="0">
-              <a:solidFill>
-                <a:schemeClr val="bg1"/>
-              </a:solidFill>
-            </a:endParaRPr>
-          </a:p>
-        </p:txBody>
-      </p:sp>
-      <p:sp>
-        <p:nvSpPr>
-          <p:cNvPr id="7" name="Rounded Rectangle 6">
-            <a:extLst>
-              <a:ext uri="{FF2B5EF4-FFF2-40B4-BE49-F238E27FC236}">
-                <a16:creationId xmlns:a16="http://schemas.microsoft.com/office/drawing/2014/main" id="{8D2DDA3B-F92F-ACB2-3148-72657A0C421A}"/>
-              </a:ext>
-            </a:extLst>
-          </p:cNvPr>
-          <p:cNvSpPr/>
-          <p:nvPr/>
-        </p:nvSpPr>
-        <p:spPr>
-          <a:xfrm>
-            <a:off x="7019585" y="2030989"/>
-            <a:ext cx="4827968" cy="964879"/>
-          </a:xfrm>
-          <a:prstGeom prst="roundRect">
-            <a:avLst/>
-          </a:prstGeom>
-        </p:spPr>
-        <p:style>
-          <a:lnRef idx="2">
-            <a:schemeClr val="accent1">
-              <a:shade val="15000"/>
-            </a:schemeClr>
-          </a:lnRef>
-          <a:fillRef idx="1">
-            <a:schemeClr val="accent1"/>
-          </a:fillRef>
-          <a:effectRef idx="0">
-            <a:schemeClr val="accent1"/>
-          </a:effectRef>
-          <a:fontRef idx="minor">
-            <a:schemeClr val="lt1"/>
-          </a:fontRef>
-        </p:style>
-        <p:txBody>
-          <a:bodyPr rtlCol="0" anchor="ctr"/>
-          <a:lstStyle/>
-          <a:p>
-            <a:pPr algn="ctr" defTabSz="877824">
-              <a:spcAft>
-                <a:spcPts val="600"/>
-              </a:spcAft>
-            </a:pPr>
-            <a:r>
-              <a:rPr lang="en-BR" sz="1728" kern="1200" dirty="0">
-                <a:solidFill>
-                  <a:schemeClr val="bg1"/>
-                </a:solidFill>
-                <a:latin typeface="+mn-lt"/>
-                <a:ea typeface="+mn-ea"/>
-                <a:cs typeface="+mn-cs"/>
-              </a:rPr>
-              <a:t>Resource based: associado a um recurso -&gt; quem pode acessar e quais ações</a:t>
-            </a:r>
-            <a:endParaRPr lang="en-BR" dirty="0">
-              <a:solidFill>
-                <a:schemeClr val="bg1"/>
-              </a:solidFill>
-            </a:endParaRPr>
-          </a:p>
-        </p:txBody>
-      </p:sp>
-      <p:cxnSp>
-        <p:nvCxnSpPr>
-          <p:cNvPr id="9" name="Straight Arrow Connector 8">
-            <a:extLst>
-              <a:ext uri="{FF2B5EF4-FFF2-40B4-BE49-F238E27FC236}">
-                <a16:creationId xmlns:a16="http://schemas.microsoft.com/office/drawing/2014/main" id="{38067A72-0AA5-0340-7A52-44B206BA5C07}"/>
-              </a:ext>
-            </a:extLst>
-          </p:cNvPr>
-          <p:cNvCxnSpPr>
-            <a:cxnSpLocks/>
-            <a:stCxn id="6" idx="3"/>
-            <a:endCxn id="5" idx="1"/>
-          </p:cNvCxnSpPr>
-          <p:nvPr/>
-        </p:nvCxnSpPr>
-        <p:spPr>
-          <a:xfrm>
-            <a:off x="4744325" y="2513818"/>
-            <a:ext cx="581114" cy="0"/>
-          </a:xfrm>
-          <a:prstGeom prst="straightConnector1">
-            <a:avLst/>
-          </a:prstGeom>
-          <a:ln>
-            <a:tailEnd type="triangle"/>
-          </a:ln>
-        </p:spPr>
-        <p:style>
-          <a:lnRef idx="2">
-            <a:schemeClr val="accent1"/>
-          </a:lnRef>
-          <a:fillRef idx="0">
-            <a:schemeClr val="accent1"/>
-          </a:fillRef>
-          <a:effectRef idx="1">
-            <a:schemeClr val="accent1"/>
-          </a:effectRef>
-          <a:fontRef idx="minor">
-            <a:schemeClr val="tx1"/>
-          </a:fontRef>
-        </p:style>
-      </p:cxnSp>
-      <p:cxnSp>
-        <p:nvCxnSpPr>
-          <p:cNvPr id="10" name="Straight Arrow Connector 9">
-            <a:extLst>
-              <a:ext uri="{FF2B5EF4-FFF2-40B4-BE49-F238E27FC236}">
-                <a16:creationId xmlns:a16="http://schemas.microsoft.com/office/drawing/2014/main" id="{A98CF4DC-7620-05A3-CCC7-18B6177D6C8B}"/>
-              </a:ext>
-            </a:extLst>
-          </p:cNvPr>
-          <p:cNvCxnSpPr>
-            <a:cxnSpLocks/>
-            <a:stCxn id="7" idx="1"/>
-            <a:endCxn id="5" idx="3"/>
-          </p:cNvCxnSpPr>
-          <p:nvPr/>
-        </p:nvCxnSpPr>
-        <p:spPr>
-          <a:xfrm flipH="1">
-            <a:off x="6297489" y="2513429"/>
-            <a:ext cx="722096" cy="389"/>
-          </a:xfrm>
-          <a:prstGeom prst="straightConnector1">
-            <a:avLst/>
-          </a:prstGeom>
-          <a:ln>
-            <a:tailEnd type="triangle"/>
-          </a:ln>
-        </p:spPr>
-        <p:style>
-          <a:lnRef idx="2">
-            <a:schemeClr val="accent1"/>
-          </a:lnRef>
-          <a:fillRef idx="0">
-            <a:schemeClr val="accent1"/>
-          </a:fillRef>
-          <a:effectRef idx="1">
-            <a:schemeClr val="accent1"/>
-          </a:effectRef>
-          <a:fontRef idx="minor">
-            <a:schemeClr val="tx1"/>
-          </a:fontRef>
-        </p:style>
-      </p:cxnSp>
-      <p:sp>
-        <p:nvSpPr>
-          <p:cNvPr id="16" name="TextBox 15">
-            <a:extLst>
-              <a:ext uri="{FF2B5EF4-FFF2-40B4-BE49-F238E27FC236}">
-                <a16:creationId xmlns:a16="http://schemas.microsoft.com/office/drawing/2014/main" id="{29923B84-5123-76CC-13E9-7801DB1E4F2C}"/>
-              </a:ext>
-            </a:extLst>
-          </p:cNvPr>
-          <p:cNvSpPr txBox="1"/>
-          <p:nvPr/>
-        </p:nvSpPr>
-        <p:spPr>
-          <a:xfrm>
-            <a:off x="641243" y="6244524"/>
-            <a:ext cx="10515600" cy="357444"/>
-          </a:xfrm>
-          <a:prstGeom prst="rect">
-            <a:avLst/>
-          </a:prstGeom>
-          <a:noFill/>
-        </p:spPr>
-        <p:txBody>
-          <a:bodyPr wrap="none" rtlCol="0">
-            <a:spAutoFit/>
-          </a:bodyPr>
-          <a:lstStyle/>
-          <a:p>
-            <a:pPr defTabSz="877824">
-              <a:spcAft>
-                <a:spcPts val="600"/>
-              </a:spcAft>
-            </a:pPr>
-            <a:r>
-              <a:rPr lang="en-BR" sz="1728" kern="1200" dirty="0">
-                <a:solidFill>
-                  <a:schemeClr val="tx1"/>
-                </a:solidFill>
-                <a:latin typeface="+mn-lt"/>
-                <a:ea typeface="+mn-ea"/>
-                <a:cs typeface="+mn-cs"/>
-              </a:rPr>
-              <a:t>Doc: </a:t>
-            </a:r>
-            <a:r>
-              <a:rPr lang="en-US" sz="1728" kern="1200" dirty="0">
-                <a:solidFill>
-                  <a:schemeClr val="tx1"/>
-                </a:solidFill>
-                <a:latin typeface="+mn-lt"/>
-                <a:ea typeface="+mn-ea"/>
-                <a:cs typeface="+mn-cs"/>
-              </a:rPr>
-              <a:t>https://docs.aws.amazon.com/</a:t>
-            </a:r>
-            <a:r>
-              <a:rPr lang="en-US" sz="1728" kern="1200" dirty="0" err="1">
-                <a:solidFill>
-                  <a:schemeClr val="tx1"/>
-                </a:solidFill>
-                <a:latin typeface="+mn-lt"/>
-                <a:ea typeface="+mn-ea"/>
-                <a:cs typeface="+mn-cs"/>
-              </a:rPr>
-              <a:t>pt_br</a:t>
-            </a:r>
-            <a:r>
-              <a:rPr lang="en-US" sz="1728" kern="1200" dirty="0">
-                <a:solidFill>
-                  <a:schemeClr val="tx1"/>
-                </a:solidFill>
-                <a:latin typeface="+mn-lt"/>
-                <a:ea typeface="+mn-ea"/>
-                <a:cs typeface="+mn-cs"/>
-              </a:rPr>
-              <a:t>/IAM/latest/UserGuide/</a:t>
-            </a:r>
-            <a:r>
-              <a:rPr lang="en-US" sz="1728" kern="1200" dirty="0" err="1">
-                <a:solidFill>
-                  <a:schemeClr val="tx1"/>
-                </a:solidFill>
-                <a:latin typeface="+mn-lt"/>
-                <a:ea typeface="+mn-ea"/>
-                <a:cs typeface="+mn-cs"/>
-              </a:rPr>
-              <a:t>access_policies_identity</a:t>
-            </a:r>
-            <a:r>
-              <a:rPr lang="en-US" sz="1728" kern="1200" dirty="0">
-                <a:solidFill>
-                  <a:schemeClr val="tx1"/>
-                </a:solidFill>
-                <a:latin typeface="+mn-lt"/>
-                <a:ea typeface="+mn-ea"/>
-                <a:cs typeface="+mn-cs"/>
-              </a:rPr>
-              <a:t>-vs-</a:t>
-            </a:r>
-            <a:r>
-              <a:rPr lang="en-US" sz="1728" kern="1200" dirty="0" err="1">
-                <a:solidFill>
-                  <a:schemeClr val="tx1"/>
-                </a:solidFill>
-                <a:latin typeface="+mn-lt"/>
-                <a:ea typeface="+mn-ea"/>
-                <a:cs typeface="+mn-cs"/>
-              </a:rPr>
-              <a:t>resource.html</a:t>
-            </a:r>
-            <a:endParaRPr lang="en-BR" dirty="0"/>
-          </a:p>
-        </p:txBody>
-      </p:sp>
-      <p:pic>
-        <p:nvPicPr>
-          <p:cNvPr id="38" name="Picture 37">
-            <a:extLst>
-              <a:ext uri="{FF2B5EF4-FFF2-40B4-BE49-F238E27FC236}">
-                <a16:creationId xmlns:a16="http://schemas.microsoft.com/office/drawing/2014/main" id="{9E3F1EC9-5988-AE1D-F014-0A7F7D36ABD8}"/>
-              </a:ext>
-            </a:extLst>
-          </p:cNvPr>
-          <p:cNvPicPr>
-            <a:picLocks noChangeAspect="1"/>
-          </p:cNvPicPr>
-          <p:nvPr/>
-        </p:nvPicPr>
-        <p:blipFill>
-          <a:blip r:embed="rId3"/>
-          <a:stretch>
-            <a:fillRect/>
-          </a:stretch>
-        </p:blipFill>
-        <p:spPr>
-          <a:xfrm>
-            <a:off x="188802" y="3208536"/>
-            <a:ext cx="3808268" cy="2658067"/>
-          </a:xfrm>
-          <a:prstGeom prst="rect">
-            <a:avLst/>
-          </a:prstGeom>
-        </p:spPr>
-      </p:pic>
-      <p:pic>
-        <p:nvPicPr>
-          <p:cNvPr id="50" name="Picture 49">
-            <a:extLst>
-              <a:ext uri="{FF2B5EF4-FFF2-40B4-BE49-F238E27FC236}">
-                <a16:creationId xmlns:a16="http://schemas.microsoft.com/office/drawing/2014/main" id="{8C68913C-76AB-2AC6-8380-0B647D27F344}"/>
-              </a:ext>
-            </a:extLst>
-          </p:cNvPr>
-          <p:cNvPicPr>
-            <a:picLocks noChangeAspect="1"/>
-          </p:cNvPicPr>
-          <p:nvPr/>
-        </p:nvPicPr>
-        <p:blipFill>
-          <a:blip r:embed="rId4"/>
-          <a:stretch>
-            <a:fillRect/>
-          </a:stretch>
-        </p:blipFill>
-        <p:spPr>
-          <a:xfrm>
-            <a:off x="7019585" y="3273177"/>
-            <a:ext cx="4827969" cy="2528786"/>
+            <a:off x="5205571" y="643466"/>
+            <a:ext cx="5924190" cy="5568739"/>
           </a:xfrm>
           <a:prstGeom prst="rect">
             <a:avLst/>
@@ -4402,7 +3558,7 @@
     </p:spTree>
     <p:extLst>
       <p:ext uri="{BB962C8B-B14F-4D97-AF65-F5344CB8AC3E}">
-        <p14:creationId xmlns:p14="http://schemas.microsoft.com/office/powerpoint/2010/main" val="667213948"/>
+        <p14:creationId xmlns:p14="http://schemas.microsoft.com/office/powerpoint/2010/main" val="2333023557"/>
       </p:ext>
     </p:extLst>
   </p:cSld>
@@ -4412,7 +3568,7 @@
 </p:sld>
 </file>
 
-<file path=ppt/slides/slide12.xml><?xml version="1.0" encoding="utf-8"?>
+<file path=ppt/slides/slide10.xml><?xml version="1.0" encoding="utf-8"?>
 <p:sld xmlns:a="http://schemas.openxmlformats.org/drawingml/2006/main" xmlns:r="http://schemas.openxmlformats.org/officeDocument/2006/relationships" xmlns:p="http://schemas.openxmlformats.org/presentationml/2006/main">
   <p:cSld>
     <p:spTree>
@@ -4448,24 +3604,24 @@
         <p:spPr>
           <a:xfrm>
             <a:off x="3888517" y="647250"/>
-            <a:ext cx="3335719" cy="646331"/>
+            <a:ext cx="3970380" cy="646331"/>
           </a:xfrm>
         </p:spPr>
         <p:txBody>
           <a:bodyPr>
-            <a:normAutofit fontScale="90000"/>
+            <a:normAutofit/>
           </a:bodyPr>
           <a:lstStyle/>
           <a:p>
             <a:r>
-              <a:rPr lang="en-BR" sz="2000" dirty="0"/>
+              <a:rPr lang="en-BR" sz="2000" b="1" dirty="0"/>
               <a:t>IAM: Identity Access Management</a:t>
             </a:r>
             <a:br>
-              <a:rPr lang="en-BR" sz="2000" dirty="0"/>
+              <a:rPr lang="en-BR" sz="2000" b="1" dirty="0"/>
             </a:br>
             <a:r>
-              <a:rPr lang="en-BR" sz="2000" dirty="0"/>
+              <a:rPr lang="en-BR" sz="2000" b="1" dirty="0"/>
               <a:t>Policy Documents</a:t>
             </a:r>
           </a:p>
@@ -4485,8 +3641,8 @@
         </p:nvSpPr>
         <p:spPr>
           <a:xfrm>
-            <a:off x="2066435" y="1635163"/>
-            <a:ext cx="6765593" cy="1754326"/>
+            <a:off x="2066434" y="1711885"/>
+            <a:ext cx="6765593" cy="1200329"/>
           </a:xfrm>
           <a:prstGeom prst="rect">
             <a:avLst/>
@@ -4520,22 +3676,6 @@
               <a:t>Outro exemplo de política baseada em recurso</a:t>
             </a:r>
           </a:p>
-          <a:p>
-            <a:pPr marL="342900" indent="-342900">
-              <a:buAutoNum type="alphaLcParenR"/>
-            </a:pPr>
-            <a:r>
-              <a:rPr lang="pt-BR" dirty="0"/>
-              <a:t>Por que é importante falarmos disso? Próximo slide</a:t>
-            </a:r>
-            <a:endParaRPr lang="en-BR" dirty="0"/>
-          </a:p>
-          <a:p>
-            <a:pPr marL="342900" indent="-342900">
-              <a:buAutoNum type="alphaLcParenR"/>
-            </a:pPr>
-            <a:endParaRPr lang="en-BR" dirty="0"/>
-          </a:p>
         </p:txBody>
       </p:sp>
       <p:pic>
@@ -4560,8 +3700,8 @@
         </p:blipFill>
         <p:spPr>
           <a:xfrm>
-            <a:off x="2104275" y="3241583"/>
-            <a:ext cx="6689912" cy="3234521"/>
+            <a:off x="2192500" y="3274438"/>
+            <a:ext cx="6727752" cy="3234521"/>
           </a:xfrm>
           <a:prstGeom prst="rect">
             <a:avLst/>
@@ -4581,7 +3721,7 @@
 </p:sld>
 </file>
 
-<file path=ppt/slides/slide13.xml><?xml version="1.0" encoding="utf-8"?>
+<file path=ppt/slides/slide11.xml><?xml version="1.0" encoding="utf-8"?>
 <p:sld xmlns:a="http://schemas.openxmlformats.org/drawingml/2006/main" xmlns:r="http://schemas.openxmlformats.org/officeDocument/2006/relationships" xmlns:p="http://schemas.openxmlformats.org/presentationml/2006/main">
   <p:cSld>
     <p:spTree>
@@ -4628,7 +3768,7 @@
           <a:p>
             <a:r>
               <a:rPr lang="en-BR" sz="2000" b="1" dirty="0"/>
-              <a:t>E quando temos diversas políticas para um mesmo recurso, como a AWS vai escolher o resultado final?</a:t>
+              <a:t>E quando temos diversas políticas para um mesmo recurso, como será escolhido o resultado final?</a:t>
             </a:r>
           </a:p>
         </p:txBody>
@@ -5218,8 +4358,8 @@
         </p:nvSpPr>
         <p:spPr>
           <a:xfrm>
-            <a:off x="8328217" y="857900"/>
-            <a:ext cx="3580498" cy="1200329"/>
+            <a:off x="6297752" y="1070163"/>
+            <a:ext cx="5725372" cy="646331"/>
           </a:xfrm>
           <a:prstGeom prst="rect">
             <a:avLst/>
@@ -5279,8 +4419,8 @@
         </p:nvSpPr>
         <p:spPr>
           <a:xfrm>
-            <a:off x="5467194" y="1339291"/>
-            <a:ext cx="2533426" cy="215153"/>
+            <a:off x="5467194" y="1346886"/>
+            <a:ext cx="478016" cy="207558"/>
           </a:xfrm>
           <a:prstGeom prst="rightArrow">
             <a:avLst/>
@@ -5324,7 +4464,7 @@
 </p:sld>
 </file>
 
-<file path=ppt/slides/slide14.xml><?xml version="1.0" encoding="utf-8"?>
+<file path=ppt/slides/slide12.xml><?xml version="1.0" encoding="utf-8"?>
 <p:sld xmlns:a="http://schemas.openxmlformats.org/drawingml/2006/main" xmlns:r="http://schemas.openxmlformats.org/officeDocument/2006/relationships" xmlns:p="http://schemas.openxmlformats.org/presentationml/2006/main">
   <p:cSld>
     <p:bg>
@@ -5904,7 +5044,7 @@
 </p:sld>
 </file>
 
-<file path=ppt/slides/slide15.xml><?xml version="1.0" encoding="utf-8"?>
+<file path=ppt/slides/slide13.xml><?xml version="1.0" encoding="utf-8"?>
 <p:sld xmlns:a="http://schemas.openxmlformats.org/drawingml/2006/main" xmlns:r="http://schemas.openxmlformats.org/officeDocument/2006/relationships" xmlns:p="http://schemas.openxmlformats.org/presentationml/2006/main">
   <p:cSld>
     <p:bg>
@@ -6368,8 +5508,8 @@
         </p:blipFill>
         <p:spPr>
           <a:xfrm>
-            <a:off x="2146874" y="3081613"/>
-            <a:ext cx="1076899" cy="949928"/>
+            <a:off x="2056091" y="3098124"/>
+            <a:ext cx="1046746" cy="923330"/>
           </a:xfrm>
           <a:prstGeom prst="rect">
             <a:avLst/>
@@ -6390,7 +5530,7 @@
         </p:nvSpPr>
         <p:spPr>
           <a:xfrm>
-            <a:off x="2146874" y="3980262"/>
+            <a:off x="1998630" y="3998643"/>
             <a:ext cx="978858" cy="369332"/>
           </a:xfrm>
           <a:prstGeom prst="rect">
@@ -6437,7 +5577,7 @@
         </p:blipFill>
         <p:spPr>
           <a:xfrm>
-            <a:off x="8873920" y="3071526"/>
+            <a:off x="8012266" y="3084825"/>
             <a:ext cx="1076899" cy="949928"/>
           </a:xfrm>
           <a:prstGeom prst="rect">
@@ -6459,7 +5599,7 @@
         </p:nvSpPr>
         <p:spPr>
           <a:xfrm>
-            <a:off x="8873920" y="4140391"/>
+            <a:off x="8012266" y="4037619"/>
             <a:ext cx="982064" cy="369332"/>
           </a:xfrm>
           <a:prstGeom prst="rect">
@@ -6506,8 +5646,8 @@
         </p:blipFill>
         <p:spPr>
           <a:xfrm>
-            <a:off x="868680" y="3191722"/>
-            <a:ext cx="842104" cy="836564"/>
+            <a:off x="1178783" y="3178713"/>
+            <a:ext cx="767199" cy="762152"/>
           </a:xfrm>
           <a:prstGeom prst="rect">
             <a:avLst/>
@@ -6528,7 +5668,7 @@
         </p:nvSpPr>
         <p:spPr>
           <a:xfrm>
-            <a:off x="556994" y="4129062"/>
+            <a:off x="437891" y="4110716"/>
             <a:ext cx="1798099" cy="923330"/>
           </a:xfrm>
           <a:prstGeom prst="rect">
@@ -6585,7 +5725,7 @@
         </p:blipFill>
         <p:spPr>
           <a:xfrm>
-            <a:off x="10136193" y="3055570"/>
+            <a:off x="9145726" y="3098124"/>
             <a:ext cx="751806" cy="746860"/>
           </a:xfrm>
           <a:prstGeom prst="rect">
@@ -6607,7 +5747,7 @@
         </p:nvSpPr>
         <p:spPr>
           <a:xfrm>
-            <a:off x="9988950" y="4050933"/>
+            <a:off x="9215120" y="4026962"/>
             <a:ext cx="1798099" cy="923330"/>
           </a:xfrm>
           <a:prstGeom prst="rect">
@@ -6659,9 +5799,9 @@
           <p:nvPr/>
         </p:nvCxnSpPr>
         <p:spPr>
-          <a:xfrm flipV="1">
-            <a:off x="3223773" y="3546490"/>
-            <a:ext cx="5650147" cy="10087"/>
+          <a:xfrm>
+            <a:off x="3102837" y="3559789"/>
+            <a:ext cx="4909429" cy="0"/>
           </a:xfrm>
           <a:prstGeom prst="straightConnector1">
             <a:avLst/>
@@ -6714,8 +5854,8 @@
         </p:blipFill>
         <p:spPr bwMode="auto">
           <a:xfrm>
-            <a:off x="11013219" y="2807067"/>
-            <a:ext cx="982064" cy="982064"/>
+            <a:off x="11063541" y="3084824"/>
+            <a:ext cx="760159" cy="760159"/>
           </a:xfrm>
           <a:prstGeom prst="rect">
             <a:avLst/>
@@ -6732,6 +5872,49 @@
           </a:extLst>
         </p:spPr>
       </p:pic>
+      <p:cxnSp>
+        <p:nvCxnSpPr>
+          <p:cNvPr id="15" name="Straight Arrow Connector 14">
+            <a:extLst>
+              <a:ext uri="{FF2B5EF4-FFF2-40B4-BE49-F238E27FC236}">
+                <a16:creationId xmlns:a16="http://schemas.microsoft.com/office/drawing/2014/main" id="{01137153-7230-2CAD-5522-DAE38497EA94}"/>
+              </a:ext>
+            </a:extLst>
+          </p:cNvPr>
+          <p:cNvCxnSpPr>
+            <a:cxnSpLocks/>
+            <a:stCxn id="12" idx="3"/>
+            <a:endCxn id="16388" idx="1"/>
+          </p:cNvCxnSpPr>
+          <p:nvPr/>
+        </p:nvCxnSpPr>
+        <p:spPr>
+          <a:xfrm flipV="1">
+            <a:off x="9897532" y="3464904"/>
+            <a:ext cx="1166009" cy="6650"/>
+          </a:xfrm>
+          <a:prstGeom prst="straightConnector1">
+            <a:avLst/>
+          </a:prstGeom>
+          <a:ln>
+            <a:tailEnd type="triangle"/>
+          </a:ln>
+        </p:spPr>
+        <p:style>
+          <a:lnRef idx="2">
+            <a:schemeClr val="accent1"/>
+          </a:lnRef>
+          <a:fillRef idx="0">
+            <a:schemeClr val="accent1"/>
+          </a:fillRef>
+          <a:effectRef idx="1">
+            <a:schemeClr val="accent1"/>
+          </a:effectRef>
+          <a:fontRef idx="minor">
+            <a:schemeClr val="tx1"/>
+          </a:fontRef>
+        </p:style>
+      </p:cxnSp>
     </p:spTree>
     <p:extLst>
       <p:ext uri="{BB962C8B-B14F-4D97-AF65-F5344CB8AC3E}">
@@ -6745,7 +5928,7 @@
 </p:sld>
 </file>
 
-<file path=ppt/slides/slide16.xml><?xml version="1.0" encoding="utf-8"?>
+<file path=ppt/slides/slide14.xml><?xml version="1.0" encoding="utf-8"?>
 <p:sld xmlns:a="http://schemas.openxmlformats.org/drawingml/2006/main" xmlns:r="http://schemas.openxmlformats.org/officeDocument/2006/relationships" xmlns:p="http://schemas.openxmlformats.org/presentationml/2006/main">
   <p:cSld>
     <p:bg>
@@ -8175,7 +7358,7 @@
 </p:sld>
 </file>
 
-<file path=ppt/slides/slide17.xml><?xml version="1.0" encoding="utf-8"?>
+<file path=ppt/slides/slide15.xml><?xml version="1.0" encoding="utf-8"?>
 <p:sld xmlns:a="http://schemas.openxmlformats.org/drawingml/2006/main" xmlns:r="http://schemas.openxmlformats.org/officeDocument/2006/relationships" xmlns:p="http://schemas.openxmlformats.org/presentationml/2006/main">
   <p:cSld>
     <p:spTree>
@@ -8287,7 +7470,7 @@
 </p:sld>
 </file>
 
-<file path=ppt/slides/slide18.xml><?xml version="1.0" encoding="utf-8"?>
+<file path=ppt/slides/slide16.xml><?xml version="1.0" encoding="utf-8"?>
 <p:sld xmlns:a="http://schemas.openxmlformats.org/drawingml/2006/main" xmlns:r="http://schemas.openxmlformats.org/officeDocument/2006/relationships" xmlns:p="http://schemas.openxmlformats.org/presentationml/2006/main">
   <p:cSld>
     <p:spTree>
@@ -8322,7 +7505,7 @@
         </p:nvSpPr>
         <p:spPr>
           <a:xfrm>
-            <a:off x="5172860" y="2848350"/>
+            <a:off x="5274242" y="4347470"/>
             <a:ext cx="2132428" cy="357887"/>
           </a:xfrm>
         </p:spPr>
@@ -8333,7 +7516,7 @@
           <a:lstStyle/>
           <a:p>
             <a:r>
-              <a:rPr lang="en-BR" sz="2000" dirty="0"/>
+              <a:rPr lang="en-BR" sz="2000" b="1" dirty="0"/>
               <a:t>AWS Control Tower</a:t>
             </a:r>
           </a:p>
@@ -8368,7 +7551,7 @@
         </p:blipFill>
         <p:spPr bwMode="auto">
           <a:xfrm>
-            <a:off x="5683261" y="3354500"/>
+            <a:off x="5927717" y="3354499"/>
             <a:ext cx="825477" cy="825477"/>
           </a:xfrm>
           <a:prstGeom prst="rect">
@@ -8501,8 +7684,8 @@
         </p:nvCxnSpPr>
         <p:spPr>
           <a:xfrm flipH="1">
-            <a:off x="3144997" y="3767239"/>
-            <a:ext cx="2538264" cy="1518350"/>
+            <a:off x="3144997" y="3767238"/>
+            <a:ext cx="2782720" cy="1518351"/>
           </a:xfrm>
           <a:prstGeom prst="straightConnector1">
             <a:avLst/>
@@ -8545,7 +7728,7 @@
         <p:spPr>
           <a:xfrm flipH="1" flipV="1">
             <a:off x="2950591" y="1916359"/>
-            <a:ext cx="2732670" cy="1850880"/>
+            <a:ext cx="2977126" cy="1850879"/>
           </a:xfrm>
           <a:prstGeom prst="straightConnector1">
             <a:avLst/>
@@ -8582,7 +7765,7 @@
 </p:sld>
 </file>
 
-<file path=ppt/slides/slide19.xml><?xml version="1.0" encoding="utf-8"?>
+<file path=ppt/slides/slide17.xml><?xml version="1.0" encoding="utf-8"?>
 <p:sld xmlns:a="http://schemas.openxmlformats.org/drawingml/2006/main" xmlns:r="http://schemas.openxmlformats.org/officeDocument/2006/relationships" xmlns:p="http://schemas.openxmlformats.org/presentationml/2006/main">
   <p:cSld>
     <p:bg>
@@ -11098,7 +10281,7 @@
         </p:blipFill>
         <p:spPr>
           <a:xfrm>
-            <a:off x="828675" y="3429000"/>
+            <a:off x="828675" y="4092751"/>
             <a:ext cx="10639425" cy="1684763"/>
           </a:xfrm>
           <a:prstGeom prst="rect">
@@ -11120,8 +10303,8 @@
         </p:nvSpPr>
         <p:spPr>
           <a:xfrm>
-            <a:off x="828675" y="1798563"/>
-            <a:ext cx="10248900" cy="1231106"/>
+            <a:off x="828675" y="2083506"/>
+            <a:ext cx="10248900" cy="1508105"/>
           </a:xfrm>
           <a:prstGeom prst="rect">
             <a:avLst/>
@@ -11144,7 +10327,7 @@
                 </a:highlight>
                 <a:latin typeface="Amazon Ember"/>
               </a:rPr>
-              <a:t>Doc AWS.: </a:t>
+              <a:t>Documentação AWS.: </a:t>
             </a:r>
             <a:r>
               <a:rPr lang="en-US" dirty="0">
@@ -11201,185 +10384,7 @@
 </p:sld>
 </file>
 
-<file path=ppt/slides/slide2.xml><?xml version="1.0" encoding="utf-8"?>
-<p:sld xmlns:a="http://schemas.openxmlformats.org/drawingml/2006/main" xmlns:r="http://schemas.openxmlformats.org/officeDocument/2006/relationships" xmlns:p="http://schemas.openxmlformats.org/presentationml/2006/main">
-  <p:cSld>
-    <p:bg>
-      <p:bgPr>
-        <a:solidFill>
-          <a:schemeClr val="bg1"/>
-        </a:solidFill>
-        <a:effectLst/>
-      </p:bgPr>
-    </p:bg>
-    <p:spTree>
-      <p:nvGrpSpPr>
-        <p:cNvPr id="1" name=""/>
-        <p:cNvGrpSpPr/>
-        <p:nvPr/>
-      </p:nvGrpSpPr>
-      <p:grpSpPr>
-        <a:xfrm>
-          <a:off x="0" y="0"/>
-          <a:ext cx="0" cy="0"/>
-          <a:chOff x="0" y="0"/>
-          <a:chExt cx="0" cy="0"/>
-        </a:xfrm>
-      </p:grpSpPr>
-      <p:sp>
-        <p:nvSpPr>
-          <p:cNvPr id="9" name="Down Arrow 7">
-            <a:extLst>
-              <a:ext uri="{FF2B5EF4-FFF2-40B4-BE49-F238E27FC236}">
-                <a16:creationId xmlns:a16="http://schemas.microsoft.com/office/drawing/2014/main" id="{D4771268-CB57-404A-9271-370EB28F6090}"/>
-              </a:ext>
-              <a:ext uri="{C183D7F6-B498-43B3-948B-1728B52AA6E4}">
-                <adec:decorative xmlns:adec="http://schemas.microsoft.com/office/drawing/2017/decorative" val="1"/>
-              </a:ext>
-            </a:extLst>
-          </p:cNvPr>
-          <p:cNvSpPr>
-            <a:spLocks noGrp="1" noRot="1" noChangeAspect="1" noMove="1" noResize="1" noEditPoints="1" noAdjustHandles="1" noChangeArrowheads="1" noChangeShapeType="1" noTextEdit="1"/>
-          </p:cNvSpPr>
-          <p:nvPr>
-            <p:extLst>
-              <p:ext uri="{386F3935-93C4-4BCD-93E2-E3B085C9AB24}">
-                <p16:designElem xmlns:p16="http://schemas.microsoft.com/office/powerpoint/2015/main" val="1"/>
-              </p:ext>
-            </p:extLst>
-          </p:nvPr>
-        </p:nvSpPr>
-        <p:spPr>
-          <a:xfrm rot="16200000">
-            <a:off x="800100" y="1491343"/>
-            <a:ext cx="3333749" cy="3499103"/>
-          </a:xfrm>
-          <a:prstGeom prst="downArrow">
-            <a:avLst>
-              <a:gd name="adj1" fmla="val 100000"/>
-              <a:gd name="adj2" fmla="val 15788"/>
-            </a:avLst>
-          </a:prstGeom>
-          <a:solidFill>
-            <a:srgbClr val="404040"/>
-          </a:solidFill>
-          <a:ln w="53975">
-            <a:noFill/>
-          </a:ln>
-        </p:spPr>
-        <p:style>
-          <a:lnRef idx="2">
-            <a:schemeClr val="accent1">
-              <a:shade val="50000"/>
-            </a:schemeClr>
-          </a:lnRef>
-          <a:fillRef idx="1">
-            <a:schemeClr val="accent1"/>
-          </a:fillRef>
-          <a:effectRef idx="0">
-            <a:schemeClr val="accent1"/>
-          </a:effectRef>
-          <a:fontRef idx="minor">
-            <a:schemeClr val="lt1"/>
-          </a:fontRef>
-        </p:style>
-        <p:txBody>
-          <a:bodyPr rtlCol="0" anchor="ctr"/>
-          <a:lstStyle/>
-          <a:p>
-            <a:pPr algn="ctr"/>
-            <a:endParaRPr lang="en-US"/>
-          </a:p>
-        </p:txBody>
-      </p:sp>
-      <p:sp>
-        <p:nvSpPr>
-          <p:cNvPr id="2" name="Title 1">
-            <a:extLst>
-              <a:ext uri="{FF2B5EF4-FFF2-40B4-BE49-F238E27FC236}">
-                <a16:creationId xmlns:a16="http://schemas.microsoft.com/office/drawing/2014/main" id="{154CA41F-BB8A-925C-CC3D-4657E9046B42}"/>
-              </a:ext>
-            </a:extLst>
-          </p:cNvPr>
-          <p:cNvSpPr>
-            <a:spLocks noGrp="1"/>
-          </p:cNvSpPr>
-          <p:nvPr>
-            <p:ph type="title"/>
-          </p:nvPr>
-        </p:nvSpPr>
-        <p:spPr>
-          <a:xfrm>
-            <a:off x="1028700" y="1967266"/>
-            <a:ext cx="2628900" cy="2547257"/>
-          </a:xfrm>
-          <a:noFill/>
-        </p:spPr>
-        <p:txBody>
-          <a:bodyPr vert="horz" lIns="91440" tIns="45720" rIns="91440" bIns="45720" rtlCol="0" anchor="ctr">
-            <a:normAutofit/>
-          </a:bodyPr>
-          <a:lstStyle/>
-          <a:p>
-            <a:pPr algn="ctr"/>
-            <a:r>
-              <a:rPr lang="en-US" sz="3600" kern="1200">
-                <a:solidFill>
-                  <a:srgbClr val="FFFFFF"/>
-                </a:solidFill>
-                <a:latin typeface="+mj-lt"/>
-                <a:ea typeface="+mj-ea"/>
-                <a:cs typeface="+mj-cs"/>
-              </a:rPr>
-              <a:t>Semana 2 – Ponto de partida	</a:t>
-            </a:r>
-          </a:p>
-        </p:txBody>
-      </p:sp>
-      <p:pic>
-        <p:nvPicPr>
-          <p:cNvPr id="4" name="Picture 3" descr="A document with text on it&#10;&#10;Description automatically generated">
-            <a:extLst>
-              <a:ext uri="{FF2B5EF4-FFF2-40B4-BE49-F238E27FC236}">
-                <a16:creationId xmlns:a16="http://schemas.microsoft.com/office/drawing/2014/main" id="{94A50622-FDA3-EF07-CCD5-202B1CF1E6BA}"/>
-              </a:ext>
-            </a:extLst>
-          </p:cNvPr>
-          <p:cNvPicPr>
-            <a:picLocks noChangeAspect="1"/>
-          </p:cNvPicPr>
-          <p:nvPr/>
-        </p:nvPicPr>
-        <p:blipFill>
-          <a:blip r:embed="rId2"/>
-          <a:stretch>
-            <a:fillRect/>
-          </a:stretch>
-        </p:blipFill>
-        <p:spPr>
-          <a:xfrm>
-            <a:off x="5205571" y="643466"/>
-            <a:ext cx="5924190" cy="5568739"/>
-          </a:xfrm>
-          <a:prstGeom prst="rect">
-            <a:avLst/>
-          </a:prstGeom>
-        </p:spPr>
-      </p:pic>
-    </p:spTree>
-    <p:extLst>
-      <p:ext uri="{BB962C8B-B14F-4D97-AF65-F5344CB8AC3E}">
-        <p14:creationId xmlns:p14="http://schemas.microsoft.com/office/powerpoint/2010/main" val="2333023557"/>
-      </p:ext>
-    </p:extLst>
-  </p:cSld>
-  <p:clrMapOvr>
-    <a:masterClrMapping/>
-  </p:clrMapOvr>
-</p:sld>
-</file>
-
-<file path=ppt/slides/slide20.xml><?xml version="1.0" encoding="utf-8"?>
+<file path=ppt/slides/slide18.xml><?xml version="1.0" encoding="utf-8"?>
 <p:sld xmlns:a="http://schemas.openxmlformats.org/drawingml/2006/main" xmlns:r="http://schemas.openxmlformats.org/officeDocument/2006/relationships" xmlns:p="http://schemas.openxmlformats.org/presentationml/2006/main">
   <p:cSld>
     <p:bg>
@@ -12046,7 +11051,7 @@
 </p:sld>
 </file>
 
-<file path=ppt/slides/slide21.xml><?xml version="1.0" encoding="utf-8"?>
+<file path=ppt/slides/slide19.xml><?xml version="1.0" encoding="utf-8"?>
 <p:sld xmlns:a="http://schemas.openxmlformats.org/drawingml/2006/main" xmlns:r="http://schemas.openxmlformats.org/officeDocument/2006/relationships" xmlns:p="http://schemas.openxmlformats.org/presentationml/2006/main">
   <p:cSld>
     <p:spTree>
@@ -12247,7 +11252,180 @@
 </p:sld>
 </file>
 
-<file path=ppt/slides/slide22.xml><?xml version="1.0" encoding="utf-8"?>
+<file path=ppt/slides/slide2.xml><?xml version="1.0" encoding="utf-8"?>
+<p:sld xmlns:a="http://schemas.openxmlformats.org/drawingml/2006/main" xmlns:r="http://schemas.openxmlformats.org/officeDocument/2006/relationships" xmlns:p="http://schemas.openxmlformats.org/presentationml/2006/main">
+  <p:cSld>
+    <p:bg>
+      <p:bgPr>
+        <a:solidFill>
+          <a:schemeClr val="bg1"/>
+        </a:solidFill>
+        <a:effectLst/>
+      </p:bgPr>
+    </p:bg>
+    <p:spTree>
+      <p:nvGrpSpPr>
+        <p:cNvPr id="1" name=""/>
+        <p:cNvGrpSpPr/>
+        <p:nvPr/>
+      </p:nvGrpSpPr>
+      <p:grpSpPr>
+        <a:xfrm>
+          <a:off x="0" y="0"/>
+          <a:ext cx="0" cy="0"/>
+          <a:chOff x="0" y="0"/>
+          <a:chExt cx="0" cy="0"/>
+        </a:xfrm>
+      </p:grpSpPr>
+      <p:sp>
+        <p:nvSpPr>
+          <p:cNvPr id="19" name="Rectangle 18">
+            <a:extLst>
+              <a:ext uri="{FF2B5EF4-FFF2-40B4-BE49-F238E27FC236}">
+                <a16:creationId xmlns:a16="http://schemas.microsoft.com/office/drawing/2014/main" id="{A4AC5506-6312-4701-8D3C-40187889A947}"/>
+              </a:ext>
+              <a:ext uri="{C183D7F6-B498-43B3-948B-1728B52AA6E4}">
+                <adec:decorative xmlns:adec="http://schemas.microsoft.com/office/drawing/2017/decorative" val="1"/>
+              </a:ext>
+            </a:extLst>
+          </p:cNvPr>
+          <p:cNvSpPr>
+            <a:spLocks noGrp="1" noRot="1" noChangeAspect="1" noMove="1" noResize="1" noEditPoints="1" noAdjustHandles="1" noChangeArrowheads="1" noChangeShapeType="1" noTextEdit="1"/>
+          </p:cNvSpPr>
+          <p:nvPr>
+            <p:extLst>
+              <p:ext uri="{386F3935-93C4-4BCD-93E2-E3B085C9AB24}">
+                <p16:designElem xmlns:p16="http://schemas.microsoft.com/office/powerpoint/2015/main" val="1"/>
+              </p:ext>
+            </p:extLst>
+          </p:nvPr>
+        </p:nvSpPr>
+        <p:spPr>
+          <a:xfrm>
+            <a:off x="0" y="651752"/>
+            <a:ext cx="12192000" cy="736551"/>
+          </a:xfrm>
+          <a:prstGeom prst="rect">
+            <a:avLst/>
+          </a:prstGeom>
+          <a:solidFill>
+            <a:schemeClr val="tx1"/>
+          </a:solidFill>
+          <a:ln>
+            <a:noFill/>
+          </a:ln>
+        </p:spPr>
+        <p:style>
+          <a:lnRef idx="2">
+            <a:schemeClr val="accent1">
+              <a:shade val="50000"/>
+            </a:schemeClr>
+          </a:lnRef>
+          <a:fillRef idx="1">
+            <a:schemeClr val="accent1"/>
+          </a:fillRef>
+          <a:effectRef idx="0">
+            <a:schemeClr val="accent1"/>
+          </a:effectRef>
+          <a:fontRef idx="minor">
+            <a:schemeClr val="lt1"/>
+          </a:fontRef>
+        </p:style>
+        <p:txBody>
+          <a:bodyPr rtlCol="0" anchor="ctr"/>
+          <a:lstStyle/>
+          <a:p>
+            <a:pPr algn="ctr"/>
+            <a:endParaRPr lang="en-US"/>
+          </a:p>
+        </p:txBody>
+      </p:sp>
+      <p:sp>
+        <p:nvSpPr>
+          <p:cNvPr id="2" name="Title 1">
+            <a:extLst>
+              <a:ext uri="{FF2B5EF4-FFF2-40B4-BE49-F238E27FC236}">
+                <a16:creationId xmlns:a16="http://schemas.microsoft.com/office/drawing/2014/main" id="{BA741BC6-744E-7992-B0F0-AB1FE5463C39}"/>
+              </a:ext>
+            </a:extLst>
+          </p:cNvPr>
+          <p:cNvSpPr>
+            <a:spLocks noGrp="1"/>
+          </p:cNvSpPr>
+          <p:nvPr>
+            <p:ph type="ctrTitle"/>
+          </p:nvPr>
+        </p:nvSpPr>
+        <p:spPr>
+          <a:xfrm>
+            <a:off x="556532" y="643467"/>
+            <a:ext cx="11210925" cy="744836"/>
+          </a:xfrm>
+        </p:spPr>
+        <p:txBody>
+          <a:bodyPr vert="horz" lIns="91440" tIns="45720" rIns="91440" bIns="45720" rtlCol="0" anchor="ctr">
+            <a:normAutofit/>
+          </a:bodyPr>
+          <a:lstStyle/>
+          <a:p>
+            <a:r>
+              <a:rPr lang="en-US" sz="3200" kern="1200">
+                <a:solidFill>
+                  <a:schemeClr val="bg1"/>
+                </a:solidFill>
+                <a:latin typeface="+mj-lt"/>
+                <a:ea typeface="+mj-ea"/>
+                <a:cs typeface="+mj-cs"/>
+              </a:rPr>
+              <a:t>Modelo de responsabilidade compartilhada da AWS</a:t>
+            </a:r>
+          </a:p>
+        </p:txBody>
+      </p:sp>
+      <p:pic>
+        <p:nvPicPr>
+          <p:cNvPr id="3" name="Picture 2">
+            <a:extLst>
+              <a:ext uri="{FF2B5EF4-FFF2-40B4-BE49-F238E27FC236}">
+                <a16:creationId xmlns:a16="http://schemas.microsoft.com/office/drawing/2014/main" id="{FF8B3620-DCEA-DD5D-2975-8B6C895C037E}"/>
+              </a:ext>
+            </a:extLst>
+          </p:cNvPr>
+          <p:cNvPicPr>
+            <a:picLocks noChangeAspect="1"/>
+          </p:cNvPicPr>
+          <p:nvPr/>
+        </p:nvPicPr>
+        <p:blipFill>
+          <a:blip r:embed="rId2"/>
+          <a:stretch>
+            <a:fillRect/>
+          </a:stretch>
+        </p:blipFill>
+        <p:spPr>
+          <a:xfrm>
+            <a:off x="2172607" y="1675227"/>
+            <a:ext cx="7846785" cy="4394199"/>
+          </a:xfrm>
+          <a:prstGeom prst="rect">
+            <a:avLst/>
+          </a:prstGeom>
+        </p:spPr>
+      </p:pic>
+    </p:spTree>
+    <p:extLst>
+      <p:ext uri="{BB962C8B-B14F-4D97-AF65-F5344CB8AC3E}">
+        <p14:creationId xmlns:p14="http://schemas.microsoft.com/office/powerpoint/2010/main" val="2170013952"/>
+      </p:ext>
+    </p:extLst>
+  </p:cSld>
+  <p:clrMapOvr>
+    <a:masterClrMapping/>
+  </p:clrMapOvr>
+</p:sld>
+</file>
+
+<file path=ppt/slides/slide20.xml><?xml version="1.0" encoding="utf-8"?>
 <p:sld xmlns:a="http://schemas.openxmlformats.org/drawingml/2006/main" xmlns:r="http://schemas.openxmlformats.org/officeDocument/2006/relationships" xmlns:p="http://schemas.openxmlformats.org/presentationml/2006/main">
   <p:cSld>
     <p:spTree>
@@ -12385,7 +11563,7 @@
 </p:sld>
 </file>
 
-<file path=ppt/slides/slide23.xml><?xml version="1.0" encoding="utf-8"?>
+<file path=ppt/slides/slide21.xml><?xml version="1.0" encoding="utf-8"?>
 <p:sld xmlns:a="http://schemas.openxmlformats.org/drawingml/2006/main" xmlns:r="http://schemas.openxmlformats.org/officeDocument/2006/relationships" xmlns:p="http://schemas.openxmlformats.org/presentationml/2006/main">
   <p:cSld>
     <p:spTree>
@@ -12480,562 +11658,7 @@
 </p:sld>
 </file>
 
-<file path=ppt/slides/slide24.xml><?xml version="1.0" encoding="utf-8"?>
-<p:sld xmlns:a="http://schemas.openxmlformats.org/drawingml/2006/main" xmlns:r="http://schemas.openxmlformats.org/officeDocument/2006/relationships" xmlns:p="http://schemas.openxmlformats.org/presentationml/2006/main">
-  <p:cSld>
-    <p:bg>
-      <p:bgPr>
-        <a:solidFill>
-          <a:schemeClr val="bg1"/>
-        </a:solidFill>
-        <a:effectLst/>
-      </p:bgPr>
-    </p:bg>
-    <p:spTree>
-      <p:nvGrpSpPr>
-        <p:cNvPr id="1" name=""/>
-        <p:cNvGrpSpPr/>
-        <p:nvPr/>
-      </p:nvGrpSpPr>
-      <p:grpSpPr>
-        <a:xfrm>
-          <a:off x="0" y="0"/>
-          <a:ext cx="0" cy="0"/>
-          <a:chOff x="0" y="0"/>
-          <a:chExt cx="0" cy="0"/>
-        </a:xfrm>
-      </p:grpSpPr>
-      <p:sp useBgFill="1">
-        <p:nvSpPr>
-          <p:cNvPr id="31" name="Rectangle 30">
-            <a:extLst>
-              <a:ext uri="{FF2B5EF4-FFF2-40B4-BE49-F238E27FC236}">
-                <a16:creationId xmlns:a16="http://schemas.microsoft.com/office/drawing/2014/main" id="{E91DC736-0EF8-4F87-9146-EBF1D2EE4D3D}"/>
-              </a:ext>
-              <a:ext uri="{C183D7F6-B498-43B3-948B-1728B52AA6E4}">
-                <adec:decorative xmlns:adec="http://schemas.microsoft.com/office/drawing/2017/decorative" val="1"/>
-              </a:ext>
-            </a:extLst>
-          </p:cNvPr>
-          <p:cNvSpPr>
-            <a:spLocks noGrp="1" noRot="1" noChangeAspect="1" noMove="1" noResize="1" noEditPoints="1" noAdjustHandles="1" noChangeArrowheads="1" noChangeShapeType="1" noTextEdit="1"/>
-          </p:cNvSpPr>
-          <p:nvPr>
-            <p:extLst>
-              <p:ext uri="{386F3935-93C4-4BCD-93E2-E3B085C9AB24}">
-                <p16:designElem xmlns:p16="http://schemas.microsoft.com/office/powerpoint/2015/main" val="1"/>
-              </p:ext>
-            </p:extLst>
-          </p:nvPr>
-        </p:nvSpPr>
-        <p:spPr>
-          <a:xfrm>
-            <a:off x="0" y="0"/>
-            <a:ext cx="12192000" cy="6858000"/>
-          </a:xfrm>
-          <a:prstGeom prst="rect">
-            <a:avLst/>
-          </a:prstGeom>
-          <a:ln>
-            <a:noFill/>
-          </a:ln>
-        </p:spPr>
-        <p:style>
-          <a:lnRef idx="2">
-            <a:schemeClr val="accent1">
-              <a:shade val="50000"/>
-            </a:schemeClr>
-          </a:lnRef>
-          <a:fillRef idx="1">
-            <a:schemeClr val="accent1"/>
-          </a:fillRef>
-          <a:effectRef idx="0">
-            <a:schemeClr val="accent1"/>
-          </a:effectRef>
-          <a:fontRef idx="minor">
-            <a:schemeClr val="lt1"/>
-          </a:fontRef>
-        </p:style>
-        <p:txBody>
-          <a:bodyPr rtlCol="0" anchor="ctr"/>
-          <a:lstStyle/>
-          <a:p>
-            <a:pPr algn="ctr"/>
-            <a:endParaRPr lang="en-US"/>
-          </a:p>
-        </p:txBody>
-      </p:sp>
-      <p:pic>
-        <p:nvPicPr>
-          <p:cNvPr id="7" name="Picture 6" descr="Kettlebells no chão">
-            <a:extLst>
-              <a:ext uri="{FF2B5EF4-FFF2-40B4-BE49-F238E27FC236}">
-                <a16:creationId xmlns:a16="http://schemas.microsoft.com/office/drawing/2014/main" id="{B955461C-9867-EDD1-E6CD-D2B9F68A2DE6}"/>
-              </a:ext>
-            </a:extLst>
-          </p:cNvPr>
-          <p:cNvPicPr>
-            <a:picLocks noChangeAspect="1"/>
-          </p:cNvPicPr>
-          <p:nvPr/>
-        </p:nvPicPr>
-        <p:blipFill>
-          <a:blip r:embed="rId2"/>
-          <a:srcRect l="20030" t="4801" r="-1" b="415"/>
-          <a:stretch/>
-        </p:blipFill>
-        <p:spPr>
-          <a:xfrm>
-            <a:off x="3523488" y="10"/>
-            <a:ext cx="8668512" cy="6857990"/>
-          </a:xfrm>
-          <a:prstGeom prst="rect">
-            <a:avLst/>
-          </a:prstGeom>
-        </p:spPr>
-      </p:pic>
-      <p:sp>
-        <p:nvSpPr>
-          <p:cNvPr id="33" name="Rectangle 32">
-            <a:extLst>
-              <a:ext uri="{FF2B5EF4-FFF2-40B4-BE49-F238E27FC236}">
-                <a16:creationId xmlns:a16="http://schemas.microsoft.com/office/drawing/2014/main" id="{097CD68E-23E3-4007-8847-CD0944C4F7BE}"/>
-              </a:ext>
-              <a:ext uri="{C183D7F6-B498-43B3-948B-1728B52AA6E4}">
-                <adec:decorative xmlns:adec="http://schemas.microsoft.com/office/drawing/2017/decorative" val="1"/>
-              </a:ext>
-            </a:extLst>
-          </p:cNvPr>
-          <p:cNvSpPr>
-            <a:spLocks noGrp="1" noRot="1" noChangeAspect="1" noMove="1" noResize="1" noEditPoints="1" noAdjustHandles="1" noChangeArrowheads="1" noChangeShapeType="1" noTextEdit="1"/>
-          </p:cNvSpPr>
-          <p:nvPr>
-            <p:extLst>
-              <p:ext uri="{386F3935-93C4-4BCD-93E2-E3B085C9AB24}">
-                <p16:designElem xmlns:p16="http://schemas.microsoft.com/office/powerpoint/2015/main" val="1"/>
-              </p:ext>
-            </p:extLst>
-          </p:nvPr>
-        </p:nvSpPr>
-        <p:spPr>
-          <a:xfrm>
-            <a:off x="0" y="0"/>
-            <a:ext cx="9756601" cy="6858000"/>
-          </a:xfrm>
-          <a:prstGeom prst="rect">
-            <a:avLst/>
-          </a:prstGeom>
-          <a:gradFill>
-            <a:gsLst>
-              <a:gs pos="58000">
-                <a:schemeClr val="bg1"/>
-              </a:gs>
-              <a:gs pos="35000">
-                <a:schemeClr val="bg1">
-                  <a:alpha val="79000"/>
-                </a:schemeClr>
-              </a:gs>
-              <a:gs pos="19000">
-                <a:schemeClr val="bg1">
-                  <a:alpha val="38000"/>
-                </a:schemeClr>
-              </a:gs>
-              <a:gs pos="0">
-                <a:schemeClr val="bg1">
-                  <a:alpha val="0"/>
-                </a:schemeClr>
-              </a:gs>
-              <a:gs pos="100000">
-                <a:schemeClr val="bg1"/>
-              </a:gs>
-            </a:gsLst>
-            <a:lin ang="10800000" scaled="0"/>
-          </a:gradFill>
-          <a:ln>
-            <a:noFill/>
-          </a:ln>
-        </p:spPr>
-        <p:style>
-          <a:lnRef idx="2">
-            <a:schemeClr val="accent1">
-              <a:shade val="50000"/>
-            </a:schemeClr>
-          </a:lnRef>
-          <a:fillRef idx="1">
-            <a:schemeClr val="accent1"/>
-          </a:fillRef>
-          <a:effectRef idx="0">
-            <a:schemeClr val="accent1"/>
-          </a:effectRef>
-          <a:fontRef idx="minor">
-            <a:schemeClr val="lt1"/>
-          </a:fontRef>
-        </p:style>
-        <p:txBody>
-          <a:bodyPr rtlCol="0" anchor="ctr"/>
-          <a:lstStyle/>
-          <a:p>
-            <a:pPr algn="ctr"/>
-            <a:endParaRPr lang="en-US" dirty="0"/>
-          </a:p>
-        </p:txBody>
-      </p:sp>
-      <p:sp>
-        <p:nvSpPr>
-          <p:cNvPr id="5" name="TextBox 4">
-            <a:extLst>
-              <a:ext uri="{FF2B5EF4-FFF2-40B4-BE49-F238E27FC236}">
-                <a16:creationId xmlns:a16="http://schemas.microsoft.com/office/drawing/2014/main" id="{7097BEAA-6F95-6199-CD7F-E87DD8814082}"/>
-              </a:ext>
-            </a:extLst>
-          </p:cNvPr>
-          <p:cNvSpPr txBox="1"/>
-          <p:nvPr/>
-        </p:nvSpPr>
-        <p:spPr>
-          <a:xfrm>
-            <a:off x="477981" y="1122363"/>
-            <a:ext cx="4023360" cy="3204134"/>
-          </a:xfrm>
-          <a:prstGeom prst="rect">
-            <a:avLst/>
-          </a:prstGeom>
-        </p:spPr>
-        <p:txBody>
-          <a:bodyPr vert="horz" lIns="91440" tIns="45720" rIns="91440" bIns="45720" rtlCol="0" anchor="b">
-            <a:normAutofit/>
-          </a:bodyPr>
-          <a:lstStyle/>
-          <a:p>
-            <a:pPr>
-              <a:lnSpc>
-                <a:spcPct val="90000"/>
-              </a:lnSpc>
-              <a:spcBef>
-                <a:spcPct val="0"/>
-              </a:spcBef>
-              <a:spcAft>
-                <a:spcPts val="600"/>
-              </a:spcAft>
-            </a:pPr>
-            <a:r>
-              <a:rPr lang="en-US" sz="4800" b="1" i="0" u="none" strike="noStrike">
-                <a:effectLst/>
-                <a:latin typeface="+mj-lt"/>
-                <a:ea typeface="+mj-ea"/>
-                <a:cs typeface="+mj-cs"/>
-              </a:rPr>
-              <a:t>Prática – Hands-on Labs</a:t>
-            </a:r>
-            <a:endParaRPr lang="en-US" sz="4800" b="0" i="0" u="none" strike="noStrike">
-              <a:effectLst/>
-              <a:latin typeface="+mj-lt"/>
-              <a:ea typeface="+mj-ea"/>
-              <a:cs typeface="+mj-cs"/>
-            </a:endParaRPr>
-          </a:p>
-          <a:p>
-            <a:pPr>
-              <a:lnSpc>
-                <a:spcPct val="90000"/>
-              </a:lnSpc>
-              <a:spcBef>
-                <a:spcPct val="0"/>
-              </a:spcBef>
-              <a:spcAft>
-                <a:spcPts val="600"/>
-              </a:spcAft>
-            </a:pPr>
-            <a:endParaRPr lang="en-US" sz="4800">
-              <a:latin typeface="+mj-lt"/>
-              <a:ea typeface="+mj-ea"/>
-              <a:cs typeface="+mj-cs"/>
-            </a:endParaRPr>
-          </a:p>
-        </p:txBody>
-      </p:sp>
-      <p:sp>
-        <p:nvSpPr>
-          <p:cNvPr id="35" name="Rectangle 34">
-            <a:extLst>
-              <a:ext uri="{FF2B5EF4-FFF2-40B4-BE49-F238E27FC236}">
-                <a16:creationId xmlns:a16="http://schemas.microsoft.com/office/drawing/2014/main" id="{AF2F604E-43BE-4DC3-B983-E071523364F8}"/>
-              </a:ext>
-              <a:ext uri="{C183D7F6-B498-43B3-948B-1728B52AA6E4}">
-                <adec:decorative xmlns:adec="http://schemas.microsoft.com/office/drawing/2017/decorative" val="1"/>
-              </a:ext>
-            </a:extLst>
-          </p:cNvPr>
-          <p:cNvSpPr>
-            <a:spLocks noGrp="1" noRot="1" noChangeAspect="1" noMove="1" noResize="1" noEditPoints="1" noAdjustHandles="1" noChangeArrowheads="1" noChangeShapeType="1" noTextEdit="1"/>
-          </p:cNvSpPr>
-          <p:nvPr>
-            <p:extLst>
-              <p:ext uri="{386F3935-93C4-4BCD-93E2-E3B085C9AB24}">
-                <p16:designElem xmlns:p16="http://schemas.microsoft.com/office/powerpoint/2015/main" val="1"/>
-              </p:ext>
-            </p:extLst>
-          </p:nvPr>
-        </p:nvSpPr>
-        <p:spPr>
-          <a:xfrm rot="5400000">
-            <a:off x="759921" y="346791"/>
-            <a:ext cx="146304" cy="704088"/>
-          </a:xfrm>
-          <a:prstGeom prst="rect">
-            <a:avLst/>
-          </a:prstGeom>
-          <a:solidFill>
-            <a:schemeClr val="accent2"/>
-          </a:solidFill>
-          <a:ln>
-            <a:noFill/>
-          </a:ln>
-        </p:spPr>
-        <p:style>
-          <a:lnRef idx="2">
-            <a:schemeClr val="accent1">
-              <a:shade val="50000"/>
-            </a:schemeClr>
-          </a:lnRef>
-          <a:fillRef idx="1">
-            <a:schemeClr val="accent1"/>
-          </a:fillRef>
-          <a:effectRef idx="0">
-            <a:schemeClr val="accent1"/>
-          </a:effectRef>
-          <a:fontRef idx="minor">
-            <a:schemeClr val="lt1"/>
-          </a:fontRef>
-        </p:style>
-        <p:txBody>
-          <a:bodyPr rtlCol="0" anchor="ctr"/>
-          <a:lstStyle/>
-          <a:p>
-            <a:pPr algn="ctr"/>
-            <a:endParaRPr lang="en-US">
-              <a:solidFill>
-                <a:prstClr val="white"/>
-              </a:solidFill>
-              <a:latin typeface="Calibri" panose="020F0502020204030204"/>
-            </a:endParaRPr>
-          </a:p>
-        </p:txBody>
-      </p:sp>
-      <p:sp>
-        <p:nvSpPr>
-          <p:cNvPr id="37" name="Rectangle 36">
-            <a:extLst>
-              <a:ext uri="{FF2B5EF4-FFF2-40B4-BE49-F238E27FC236}">
-                <a16:creationId xmlns:a16="http://schemas.microsoft.com/office/drawing/2014/main" id="{08C9B587-E65E-4B52-B37C-ABEBB6E87928}"/>
-              </a:ext>
-              <a:ext uri="{C183D7F6-B498-43B3-948B-1728B52AA6E4}">
-                <adec:decorative xmlns:adec="http://schemas.microsoft.com/office/drawing/2017/decorative" val="1"/>
-              </a:ext>
-            </a:extLst>
-          </p:cNvPr>
-          <p:cNvSpPr>
-            <a:spLocks noGrp="1" noRot="1" noChangeAspect="1" noMove="1" noResize="1" noEditPoints="1" noAdjustHandles="1" noChangeArrowheads="1" noChangeShapeType="1" noTextEdit="1"/>
-          </p:cNvSpPr>
-          <p:nvPr>
-            <p:extLst>
-              <p:ext uri="{386F3935-93C4-4BCD-93E2-E3B085C9AB24}">
-                <p16:designElem xmlns:p16="http://schemas.microsoft.com/office/powerpoint/2015/main" val="1"/>
-              </p:ext>
-            </p:extLst>
-          </p:nvPr>
-        </p:nvSpPr>
-        <p:spPr>
-          <a:xfrm>
-            <a:off x="481029" y="4546920"/>
-            <a:ext cx="3977640" cy="18288"/>
-          </a:xfrm>
-          <a:prstGeom prst="rect">
-            <a:avLst/>
-          </a:prstGeom>
-          <a:solidFill>
-            <a:srgbClr val="D5D5D5"/>
-          </a:solidFill>
-          <a:ln w="3175">
-            <a:noFill/>
-          </a:ln>
-          <a:effectLst/>
-        </p:spPr>
-        <p:style>
-          <a:lnRef idx="2">
-            <a:schemeClr val="accent1">
-              <a:shade val="50000"/>
-            </a:schemeClr>
-          </a:lnRef>
-          <a:fillRef idx="1">
-            <a:schemeClr val="accent1"/>
-          </a:fillRef>
-          <a:effectRef idx="0">
-            <a:schemeClr val="accent1"/>
-          </a:effectRef>
-          <a:fontRef idx="minor">
-            <a:schemeClr val="lt1"/>
-          </a:fontRef>
-        </p:style>
-        <p:txBody>
-          <a:bodyPr rtlCol="0" anchor="ctr"/>
-          <a:lstStyle/>
-          <a:p>
-            <a:pPr marL="0" marR="0" lvl="0" indent="0" algn="ctr" defTabSz="914400" rtl="0" eaLnBrk="1" fontAlgn="auto" latinLnBrk="0" hangingPunct="1">
-              <a:lnSpc>
-                <a:spcPct val="100000"/>
-              </a:lnSpc>
-              <a:spcBef>
-                <a:spcPts val="0"/>
-              </a:spcBef>
-              <a:spcAft>
-                <a:spcPts val="0"/>
-              </a:spcAft>
-              <a:buClrTx/>
-              <a:buSzTx/>
-              <a:buFontTx/>
-              <a:buNone/>
-              <a:tabLst/>
-              <a:defRPr/>
-            </a:pPr>
-            <a:endParaRPr kumimoji="0" lang="en-US" sz="1800" b="0" i="0" u="none" strike="noStrike" kern="1200" cap="none" spc="0" normalizeH="0" baseline="0" noProof="0">
-              <a:ln>
-                <a:noFill/>
-              </a:ln>
-              <a:solidFill>
-                <a:prstClr val="white"/>
-              </a:solidFill>
-              <a:effectLst/>
-              <a:uLnTx/>
-              <a:uFillTx/>
-              <a:latin typeface="Calibri" panose="020F0502020204030204"/>
-              <a:ea typeface="+mn-ea"/>
-              <a:cs typeface="+mn-cs"/>
-            </a:endParaRPr>
-          </a:p>
-        </p:txBody>
-      </p:sp>
-    </p:spTree>
-    <p:extLst>
-      <p:ext uri="{BB962C8B-B14F-4D97-AF65-F5344CB8AC3E}">
-        <p14:creationId xmlns:p14="http://schemas.microsoft.com/office/powerpoint/2010/main" val="3900091783"/>
-      </p:ext>
-    </p:extLst>
-  </p:cSld>
-  <p:clrMapOvr>
-    <a:overrideClrMapping bg1="lt1" tx1="dk1" bg2="lt2" tx2="dk2" accent1="accent1" accent2="accent2" accent3="accent3" accent4="accent4" accent5="accent5" accent6="accent6" hlink="hlink" folHlink="folHlink"/>
-  </p:clrMapOvr>
-</p:sld>
-</file>
-
-<file path=ppt/slides/slide25.xml><?xml version="1.0" encoding="utf-8"?>
-<p:sld xmlns:a="http://schemas.openxmlformats.org/drawingml/2006/main" xmlns:r="http://schemas.openxmlformats.org/officeDocument/2006/relationships" xmlns:p="http://schemas.openxmlformats.org/presentationml/2006/main">
-  <p:cSld>
-    <p:spTree>
-      <p:nvGrpSpPr>
-        <p:cNvPr id="1" name=""/>
-        <p:cNvGrpSpPr/>
-        <p:nvPr/>
-      </p:nvGrpSpPr>
-      <p:grpSpPr>
-        <a:xfrm>
-          <a:off x="0" y="0"/>
-          <a:ext cx="0" cy="0"/>
-          <a:chOff x="0" y="0"/>
-          <a:chExt cx="0" cy="0"/>
-        </a:xfrm>
-      </p:grpSpPr>
-      <p:sp>
-        <p:nvSpPr>
-          <p:cNvPr id="2" name="Title 1">
-            <a:extLst>
-              <a:ext uri="{FF2B5EF4-FFF2-40B4-BE49-F238E27FC236}">
-                <a16:creationId xmlns:a16="http://schemas.microsoft.com/office/drawing/2014/main" id="{BA741BC6-744E-7992-B0F0-AB1FE5463C39}"/>
-              </a:ext>
-            </a:extLst>
-          </p:cNvPr>
-          <p:cNvSpPr>
-            <a:spLocks noGrp="1"/>
-          </p:cNvSpPr>
-          <p:nvPr>
-            <p:ph type="ctrTitle"/>
-          </p:nvPr>
-        </p:nvSpPr>
-        <p:spPr>
-          <a:xfrm>
-            <a:off x="888352" y="2244314"/>
-            <a:ext cx="10415296" cy="2369371"/>
-          </a:xfrm>
-        </p:spPr>
-        <p:txBody>
-          <a:bodyPr>
-            <a:normAutofit/>
-          </a:bodyPr>
-          <a:lstStyle/>
-          <a:p>
-            <a:r>
-              <a:rPr lang="en-US" sz="2000" dirty="0"/>
-              <a:t>- LAB 1: </a:t>
-            </a:r>
-            <a:r>
-              <a:rPr lang="en-US" sz="2000" dirty="0">
-                <a:hlinkClick r:id="rId2"/>
-              </a:rPr>
-              <a:t>https://explore.skillbuilder.aws/learn/course/20119/play/132191/start-aws-simulearn</a:t>
-            </a:r>
-            <a:br>
-              <a:rPr lang="en-US" sz="2000" dirty="0"/>
-            </a:br>
-            <a:br>
-              <a:rPr lang="en-US" sz="2000" dirty="0"/>
-            </a:br>
-            <a:r>
-              <a:rPr lang="en-US" sz="2000" dirty="0"/>
-              <a:t>- LAB 2: </a:t>
-            </a:r>
-            <a:r>
-              <a:rPr lang="en-US" sz="2000" dirty="0">
-                <a:hlinkClick r:id="rId3"/>
-              </a:rPr>
-              <a:t>https://explore.skillbuilder.aws/learn/course/20135/play/132239/start-aws-simulearn;lp=2227</a:t>
-            </a:r>
-            <a:br>
-              <a:rPr lang="en-US" sz="2000" dirty="0"/>
-            </a:br>
-            <a:br>
-              <a:rPr lang="en-US" sz="2000" dirty="0"/>
-            </a:br>
-            <a:r>
-              <a:rPr lang="en-US" sz="2000" dirty="0"/>
-              <a:t>- </a:t>
-            </a:r>
-            <a:r>
-              <a:rPr lang="en-US" sz="2000" dirty="0">
-                <a:hlinkClick r:id="rId4"/>
-              </a:rPr>
-              <a:t>https://explore.skillbuilder.aws/learn/learning_plan/view/2227/aws-simulearn-solutions-architect</a:t>
-            </a:r>
-            <a:br>
-              <a:rPr lang="en-US" sz="2000" dirty="0"/>
-            </a:br>
-            <a:endParaRPr lang="en-BR" sz="2000" dirty="0"/>
-          </a:p>
-        </p:txBody>
-      </p:sp>
-    </p:spTree>
-    <p:extLst>
-      <p:ext uri="{BB962C8B-B14F-4D97-AF65-F5344CB8AC3E}">
-        <p14:creationId xmlns:p14="http://schemas.microsoft.com/office/powerpoint/2010/main" val="2914392378"/>
-      </p:ext>
-    </p:extLst>
-  </p:cSld>
-  <p:clrMapOvr>
-    <a:masterClrMapping/>
-  </p:clrMapOvr>
-</p:sld>
-</file>
-
-<file path=ppt/slides/slide26.xml><?xml version="1.0" encoding="utf-8"?>
+<file path=ppt/slides/slide22.xml><?xml version="1.0" encoding="utf-8"?>
 <p:sld xmlns:a="http://schemas.openxmlformats.org/drawingml/2006/main" xmlns:r="http://schemas.openxmlformats.org/officeDocument/2006/relationships" xmlns:p="http://schemas.openxmlformats.org/presentationml/2006/main">
   <p:cSld>
     <p:bg>
@@ -13793,7 +12416,7 @@
 </p:sld>
 </file>
 
-<file path=ppt/slides/slide27.xml><?xml version="1.0" encoding="utf-8"?>
+<file path=ppt/slides/slide23.xml><?xml version="1.0" encoding="utf-8"?>
 <p:sld xmlns:a="http://schemas.openxmlformats.org/drawingml/2006/main" xmlns:r="http://schemas.openxmlformats.org/officeDocument/2006/relationships" xmlns:p="http://schemas.openxmlformats.org/presentationml/2006/main">
   <p:cSld>
     <p:bg>
@@ -14766,7 +13389,7 @@
 </p:sld>
 </file>
 
-<file path=ppt/slides/slide28.xml><?xml version="1.0" encoding="utf-8"?>
+<file path=ppt/slides/slide24.xml><?xml version="1.0" encoding="utf-8"?>
 <p:sld xmlns:a="http://schemas.openxmlformats.org/drawingml/2006/main" xmlns:r="http://schemas.openxmlformats.org/officeDocument/2006/relationships" xmlns:p="http://schemas.openxmlformats.org/presentationml/2006/main">
   <p:cSld>
     <p:bg>
@@ -15690,7 +14313,7 @@
 </p:sld>
 </file>
 
-<file path=ppt/slides/slide29.xml><?xml version="1.0" encoding="utf-8"?>
+<file path=ppt/slides/slide25.xml><?xml version="1.0" encoding="utf-8"?>
 <p:sld xmlns:a="http://schemas.openxmlformats.org/drawingml/2006/main" xmlns:r="http://schemas.openxmlformats.org/officeDocument/2006/relationships" xmlns:p="http://schemas.openxmlformats.org/presentationml/2006/main">
   <p:cSld>
     <p:bg>
@@ -16928,180 +15551,7 @@
 </p:sld>
 </file>
 
-<file path=ppt/slides/slide3.xml><?xml version="1.0" encoding="utf-8"?>
-<p:sld xmlns:a="http://schemas.openxmlformats.org/drawingml/2006/main" xmlns:r="http://schemas.openxmlformats.org/officeDocument/2006/relationships" xmlns:p="http://schemas.openxmlformats.org/presentationml/2006/main">
-  <p:cSld>
-    <p:bg>
-      <p:bgPr>
-        <a:solidFill>
-          <a:schemeClr val="bg1"/>
-        </a:solidFill>
-        <a:effectLst/>
-      </p:bgPr>
-    </p:bg>
-    <p:spTree>
-      <p:nvGrpSpPr>
-        <p:cNvPr id="1" name=""/>
-        <p:cNvGrpSpPr/>
-        <p:nvPr/>
-      </p:nvGrpSpPr>
-      <p:grpSpPr>
-        <a:xfrm>
-          <a:off x="0" y="0"/>
-          <a:ext cx="0" cy="0"/>
-          <a:chOff x="0" y="0"/>
-          <a:chExt cx="0" cy="0"/>
-        </a:xfrm>
-      </p:grpSpPr>
-      <p:sp>
-        <p:nvSpPr>
-          <p:cNvPr id="19" name="Rectangle 18">
-            <a:extLst>
-              <a:ext uri="{FF2B5EF4-FFF2-40B4-BE49-F238E27FC236}">
-                <a16:creationId xmlns:a16="http://schemas.microsoft.com/office/drawing/2014/main" id="{A4AC5506-6312-4701-8D3C-40187889A947}"/>
-              </a:ext>
-              <a:ext uri="{C183D7F6-B498-43B3-948B-1728B52AA6E4}">
-                <adec:decorative xmlns:adec="http://schemas.microsoft.com/office/drawing/2017/decorative" val="1"/>
-              </a:ext>
-            </a:extLst>
-          </p:cNvPr>
-          <p:cNvSpPr>
-            <a:spLocks noGrp="1" noRot="1" noChangeAspect="1" noMove="1" noResize="1" noEditPoints="1" noAdjustHandles="1" noChangeArrowheads="1" noChangeShapeType="1" noTextEdit="1"/>
-          </p:cNvSpPr>
-          <p:nvPr>
-            <p:extLst>
-              <p:ext uri="{386F3935-93C4-4BCD-93E2-E3B085C9AB24}">
-                <p16:designElem xmlns:p16="http://schemas.microsoft.com/office/powerpoint/2015/main" val="1"/>
-              </p:ext>
-            </p:extLst>
-          </p:nvPr>
-        </p:nvSpPr>
-        <p:spPr>
-          <a:xfrm>
-            <a:off x="0" y="651752"/>
-            <a:ext cx="12192000" cy="736551"/>
-          </a:xfrm>
-          <a:prstGeom prst="rect">
-            <a:avLst/>
-          </a:prstGeom>
-          <a:solidFill>
-            <a:schemeClr val="tx1"/>
-          </a:solidFill>
-          <a:ln>
-            <a:noFill/>
-          </a:ln>
-        </p:spPr>
-        <p:style>
-          <a:lnRef idx="2">
-            <a:schemeClr val="accent1">
-              <a:shade val="50000"/>
-            </a:schemeClr>
-          </a:lnRef>
-          <a:fillRef idx="1">
-            <a:schemeClr val="accent1"/>
-          </a:fillRef>
-          <a:effectRef idx="0">
-            <a:schemeClr val="accent1"/>
-          </a:effectRef>
-          <a:fontRef idx="minor">
-            <a:schemeClr val="lt1"/>
-          </a:fontRef>
-        </p:style>
-        <p:txBody>
-          <a:bodyPr rtlCol="0" anchor="ctr"/>
-          <a:lstStyle/>
-          <a:p>
-            <a:pPr algn="ctr"/>
-            <a:endParaRPr lang="en-US"/>
-          </a:p>
-        </p:txBody>
-      </p:sp>
-      <p:sp>
-        <p:nvSpPr>
-          <p:cNvPr id="2" name="Title 1">
-            <a:extLst>
-              <a:ext uri="{FF2B5EF4-FFF2-40B4-BE49-F238E27FC236}">
-                <a16:creationId xmlns:a16="http://schemas.microsoft.com/office/drawing/2014/main" id="{BA741BC6-744E-7992-B0F0-AB1FE5463C39}"/>
-              </a:ext>
-            </a:extLst>
-          </p:cNvPr>
-          <p:cNvSpPr>
-            <a:spLocks noGrp="1"/>
-          </p:cNvSpPr>
-          <p:nvPr>
-            <p:ph type="ctrTitle"/>
-          </p:nvPr>
-        </p:nvSpPr>
-        <p:spPr>
-          <a:xfrm>
-            <a:off x="556532" y="643467"/>
-            <a:ext cx="11210925" cy="744836"/>
-          </a:xfrm>
-        </p:spPr>
-        <p:txBody>
-          <a:bodyPr vert="horz" lIns="91440" tIns="45720" rIns="91440" bIns="45720" rtlCol="0" anchor="ctr">
-            <a:normAutofit/>
-          </a:bodyPr>
-          <a:lstStyle/>
-          <a:p>
-            <a:r>
-              <a:rPr lang="en-US" sz="3200" kern="1200">
-                <a:solidFill>
-                  <a:schemeClr val="bg1"/>
-                </a:solidFill>
-                <a:latin typeface="+mj-lt"/>
-                <a:ea typeface="+mj-ea"/>
-                <a:cs typeface="+mj-cs"/>
-              </a:rPr>
-              <a:t>Modelo de responsabilidade compartilhada da AWS</a:t>
-            </a:r>
-          </a:p>
-        </p:txBody>
-      </p:sp>
-      <p:pic>
-        <p:nvPicPr>
-          <p:cNvPr id="3" name="Picture 2">
-            <a:extLst>
-              <a:ext uri="{FF2B5EF4-FFF2-40B4-BE49-F238E27FC236}">
-                <a16:creationId xmlns:a16="http://schemas.microsoft.com/office/drawing/2014/main" id="{FF8B3620-DCEA-DD5D-2975-8B6C895C037E}"/>
-              </a:ext>
-            </a:extLst>
-          </p:cNvPr>
-          <p:cNvPicPr>
-            <a:picLocks noChangeAspect="1"/>
-          </p:cNvPicPr>
-          <p:nvPr/>
-        </p:nvPicPr>
-        <p:blipFill>
-          <a:blip r:embed="rId2"/>
-          <a:stretch>
-            <a:fillRect/>
-          </a:stretch>
-        </p:blipFill>
-        <p:spPr>
-          <a:xfrm>
-            <a:off x="2172607" y="1675227"/>
-            <a:ext cx="7846785" cy="4394199"/>
-          </a:xfrm>
-          <a:prstGeom prst="rect">
-            <a:avLst/>
-          </a:prstGeom>
-        </p:spPr>
-      </p:pic>
-    </p:spTree>
-    <p:extLst>
-      <p:ext uri="{BB962C8B-B14F-4D97-AF65-F5344CB8AC3E}">
-        <p14:creationId xmlns:p14="http://schemas.microsoft.com/office/powerpoint/2010/main" val="2170013952"/>
-      </p:ext>
-    </p:extLst>
-  </p:cSld>
-  <p:clrMapOvr>
-    <a:masterClrMapping/>
-  </p:clrMapOvr>
-</p:sld>
-</file>
-
-<file path=ppt/slides/slide30.xml><?xml version="1.0" encoding="utf-8"?>
+<file path=ppt/slides/slide26.xml><?xml version="1.0" encoding="utf-8"?>
 <p:sld xmlns:a="http://schemas.openxmlformats.org/drawingml/2006/main" xmlns:r="http://schemas.openxmlformats.org/officeDocument/2006/relationships" xmlns:p="http://schemas.openxmlformats.org/presentationml/2006/main">
   <p:cSld>
     <p:bg>
@@ -18538,7 +16988,7 @@
 </p:sld>
 </file>
 
-<file path=ppt/slides/slide31.xml><?xml version="1.0" encoding="utf-8"?>
+<file path=ppt/slides/slide27.xml><?xml version="1.0" encoding="utf-8"?>
 <p:sld xmlns:a="http://schemas.openxmlformats.org/drawingml/2006/main" xmlns:r="http://schemas.openxmlformats.org/officeDocument/2006/relationships" xmlns:p="http://schemas.openxmlformats.org/presentationml/2006/main">
   <p:cSld>
     <p:bg>
@@ -19824,7 +18274,7 @@
 </p:sld>
 </file>
 
-<file path=ppt/slides/slide32.xml><?xml version="1.0" encoding="utf-8"?>
+<file path=ppt/slides/slide28.xml><?xml version="1.0" encoding="utf-8"?>
 <p:sld xmlns:a="http://schemas.openxmlformats.org/drawingml/2006/main" xmlns:r="http://schemas.openxmlformats.org/officeDocument/2006/relationships" xmlns:p="http://schemas.openxmlformats.org/presentationml/2006/main">
   <p:cSld>
     <p:bg>
@@ -21306,203 +19756,7 @@
 </p:sld>
 </file>
 
-<file path=ppt/slides/slide4.xml><?xml version="1.0" encoding="utf-8"?>
-<p:sld xmlns:a="http://schemas.openxmlformats.org/drawingml/2006/main" xmlns:r="http://schemas.openxmlformats.org/officeDocument/2006/relationships" xmlns:p="http://schemas.openxmlformats.org/presentationml/2006/main">
-  <p:cSld>
-    <p:bg>
-      <p:bgPr>
-        <a:solidFill>
-          <a:schemeClr val="bg1"/>
-        </a:solidFill>
-        <a:effectLst/>
-      </p:bgPr>
-    </p:bg>
-    <p:spTree>
-      <p:nvGrpSpPr>
-        <p:cNvPr id="1" name=""/>
-        <p:cNvGrpSpPr/>
-        <p:nvPr/>
-      </p:nvGrpSpPr>
-      <p:grpSpPr>
-        <a:xfrm>
-          <a:off x="0" y="0"/>
-          <a:ext cx="0" cy="0"/>
-          <a:chOff x="0" y="0"/>
-          <a:chExt cx="0" cy="0"/>
-        </a:xfrm>
-      </p:grpSpPr>
-      <p:sp>
-        <p:nvSpPr>
-          <p:cNvPr id="19" name="Rectangle 18">
-            <a:extLst>
-              <a:ext uri="{FF2B5EF4-FFF2-40B4-BE49-F238E27FC236}">
-                <a16:creationId xmlns:a16="http://schemas.microsoft.com/office/drawing/2014/main" id="{A4AC5506-6312-4701-8D3C-40187889A947}"/>
-              </a:ext>
-              <a:ext uri="{C183D7F6-B498-43B3-948B-1728B52AA6E4}">
-                <adec:decorative xmlns:adec="http://schemas.microsoft.com/office/drawing/2017/decorative" val="1"/>
-              </a:ext>
-            </a:extLst>
-          </p:cNvPr>
-          <p:cNvSpPr>
-            <a:spLocks noGrp="1" noRot="1" noChangeAspect="1" noMove="1" noResize="1" noEditPoints="1" noAdjustHandles="1" noChangeArrowheads="1" noChangeShapeType="1" noTextEdit="1"/>
-          </p:cNvSpPr>
-          <p:nvPr>
-            <p:extLst>
-              <p:ext uri="{386F3935-93C4-4BCD-93E2-E3B085C9AB24}">
-                <p16:designElem xmlns:p16="http://schemas.microsoft.com/office/powerpoint/2015/main" val="1"/>
-              </p:ext>
-            </p:extLst>
-          </p:nvPr>
-        </p:nvSpPr>
-        <p:spPr>
-          <a:xfrm>
-            <a:off x="0" y="651752"/>
-            <a:ext cx="12192000" cy="736551"/>
-          </a:xfrm>
-          <a:prstGeom prst="rect">
-            <a:avLst/>
-          </a:prstGeom>
-          <a:solidFill>
-            <a:schemeClr val="tx1"/>
-          </a:solidFill>
-          <a:ln>
-            <a:noFill/>
-          </a:ln>
-        </p:spPr>
-        <p:style>
-          <a:lnRef idx="2">
-            <a:schemeClr val="accent1">
-              <a:shade val="50000"/>
-            </a:schemeClr>
-          </a:lnRef>
-          <a:fillRef idx="1">
-            <a:schemeClr val="accent1"/>
-          </a:fillRef>
-          <a:effectRef idx="0">
-            <a:schemeClr val="accent1"/>
-          </a:effectRef>
-          <a:fontRef idx="minor">
-            <a:schemeClr val="lt1"/>
-          </a:fontRef>
-        </p:style>
-        <p:txBody>
-          <a:bodyPr rtlCol="0" anchor="ctr"/>
-          <a:lstStyle/>
-          <a:p>
-            <a:pPr algn="ctr"/>
-            <a:endParaRPr lang="en-US"/>
-          </a:p>
-        </p:txBody>
-      </p:sp>
-      <p:sp>
-        <p:nvSpPr>
-          <p:cNvPr id="2" name="Title 1">
-            <a:extLst>
-              <a:ext uri="{FF2B5EF4-FFF2-40B4-BE49-F238E27FC236}">
-                <a16:creationId xmlns:a16="http://schemas.microsoft.com/office/drawing/2014/main" id="{BA741BC6-744E-7992-B0F0-AB1FE5463C39}"/>
-              </a:ext>
-            </a:extLst>
-          </p:cNvPr>
-          <p:cNvSpPr>
-            <a:spLocks noGrp="1"/>
-          </p:cNvSpPr>
-          <p:nvPr>
-            <p:ph type="ctrTitle"/>
-          </p:nvPr>
-        </p:nvSpPr>
-        <p:spPr>
-          <a:xfrm>
-            <a:off x="556532" y="643467"/>
-            <a:ext cx="11210925" cy="744836"/>
-          </a:xfrm>
-        </p:spPr>
-        <p:txBody>
-          <a:bodyPr vert="horz" lIns="91440" tIns="45720" rIns="91440" bIns="45720" rtlCol="0" anchor="ctr">
-            <a:normAutofit/>
-          </a:bodyPr>
-          <a:lstStyle/>
-          <a:p>
-            <a:r>
-              <a:rPr lang="en-US" sz="3200" kern="1200">
-                <a:solidFill>
-                  <a:schemeClr val="bg1"/>
-                </a:solidFill>
-                <a:latin typeface="+mj-lt"/>
-                <a:ea typeface="+mj-ea"/>
-                <a:cs typeface="+mj-cs"/>
-              </a:rPr>
-              <a:t>Modelo de responsabilidade compartilhada da AWS</a:t>
-            </a:r>
-          </a:p>
-        </p:txBody>
-      </p:sp>
-      <p:sp>
-        <p:nvSpPr>
-          <p:cNvPr id="4" name="Rounded Rectangle 3">
-            <a:extLst>
-              <a:ext uri="{FF2B5EF4-FFF2-40B4-BE49-F238E27FC236}">
-                <a16:creationId xmlns:a16="http://schemas.microsoft.com/office/drawing/2014/main" id="{5B90B455-87F0-1CF7-760F-1253D13F3CA9}"/>
-              </a:ext>
-            </a:extLst>
-          </p:cNvPr>
-          <p:cNvSpPr/>
-          <p:nvPr/>
-        </p:nvSpPr>
-        <p:spPr>
-          <a:xfrm>
-            <a:off x="964602" y="3087445"/>
-            <a:ext cx="10262795" cy="1839557"/>
-          </a:xfrm>
-          <a:prstGeom prst="roundRect">
-            <a:avLst/>
-          </a:prstGeom>
-        </p:spPr>
-        <p:style>
-          <a:lnRef idx="2">
-            <a:schemeClr val="accent1">
-              <a:shade val="15000"/>
-            </a:schemeClr>
-          </a:lnRef>
-          <a:fillRef idx="1">
-            <a:schemeClr val="accent1"/>
-          </a:fillRef>
-          <a:effectRef idx="0">
-            <a:schemeClr val="accent1"/>
-          </a:effectRef>
-          <a:fontRef idx="minor">
-            <a:schemeClr val="lt1"/>
-          </a:fontRef>
-        </p:style>
-        <p:txBody>
-          <a:bodyPr rtlCol="0" anchor="ctr"/>
-          <a:lstStyle/>
-          <a:p>
-            <a:pPr algn="ctr"/>
-            <a:r>
-              <a:rPr lang="en-BR" b="1" dirty="0"/>
-              <a:t>- Dica legal (referência CloudGuru): </a:t>
-            </a:r>
-            <a:r>
-              <a:rPr lang="en-BR" dirty="0"/>
-              <a:t>Quando estamos diante de uma pergunta se a responsabilidade é do cliente ou da AWS, vamos nos perguntar, consigo fazer tal ação no Console da AWS? Se a resposta for sim, provavelmente a responsabilidade é nossa. Exemplo, não podemos interferir no cabeamento dos datacenters, atualizar o sistema operacional do RDS, gerenciar os data centers etc.</a:t>
-            </a:r>
-          </a:p>
-        </p:txBody>
-      </p:sp>
-    </p:spTree>
-    <p:extLst>
-      <p:ext uri="{BB962C8B-B14F-4D97-AF65-F5344CB8AC3E}">
-        <p14:creationId xmlns:p14="http://schemas.microsoft.com/office/powerpoint/2010/main" val="3392393084"/>
-      </p:ext>
-    </p:extLst>
-  </p:cSld>
-  <p:clrMapOvr>
-    <a:masterClrMapping/>
-  </p:clrMapOvr>
-</p:sld>
-</file>
-
-<file path=ppt/slides/slide5.xml><?xml version="1.0" encoding="utf-8"?>
+<file path=ppt/slides/slide3.xml><?xml version="1.0" encoding="utf-8"?>
 <p:sld xmlns:a="http://schemas.openxmlformats.org/drawingml/2006/main" xmlns:r="http://schemas.openxmlformats.org/officeDocument/2006/relationships" xmlns:p="http://schemas.openxmlformats.org/presentationml/2006/main">
   <p:cSld>
     <p:bg>
@@ -22111,7 +20365,7 @@
 </p:sld>
 </file>
 
-<file path=ppt/slides/slide6.xml><?xml version="1.0" encoding="utf-8"?>
+<file path=ppt/slides/slide4.xml><?xml version="1.0" encoding="utf-8"?>
 <p:sld xmlns:a="http://schemas.openxmlformats.org/drawingml/2006/main" xmlns:r="http://schemas.openxmlformats.org/officeDocument/2006/relationships" xmlns:p="http://schemas.openxmlformats.org/presentationml/2006/main">
   <p:cSld>
     <p:bg>
@@ -23205,7 +21459,7 @@
 </p:sld>
 </file>
 
-<file path=ppt/slides/slide7.xml><?xml version="1.0" encoding="utf-8"?>
+<file path=ppt/slides/slide5.xml><?xml version="1.0" encoding="utf-8"?>
 <p:sld xmlns:a="http://schemas.openxmlformats.org/drawingml/2006/main" xmlns:r="http://schemas.openxmlformats.org/officeDocument/2006/relationships" xmlns:p="http://schemas.openxmlformats.org/presentationml/2006/main">
   <p:cSld>
     <p:spTree>
@@ -23645,7 +21899,7 @@
 </p:sld>
 </file>
 
-<file path=ppt/slides/slide8.xml><?xml version="1.0" encoding="utf-8"?>
+<file path=ppt/slides/slide6.xml><?xml version="1.0" encoding="utf-8"?>
 <p:sld xmlns:a="http://schemas.openxmlformats.org/drawingml/2006/main" xmlns:r="http://schemas.openxmlformats.org/officeDocument/2006/relationships" xmlns:p="http://schemas.openxmlformats.org/presentationml/2006/main">
   <p:cSld>
     <p:spTree>
@@ -23680,7 +21934,7 @@
         </p:nvSpPr>
         <p:spPr>
           <a:xfrm>
-            <a:off x="4232762" y="4336521"/>
+            <a:off x="4290615" y="4798815"/>
             <a:ext cx="3335719" cy="334962"/>
           </a:xfrm>
         </p:spPr>
@@ -23726,7 +21980,7 @@
         </p:blipFill>
         <p:spPr bwMode="auto">
           <a:xfrm>
-            <a:off x="5475438" y="3369808"/>
+            <a:off x="5627359" y="3777581"/>
             <a:ext cx="850369" cy="850369"/>
           </a:xfrm>
           <a:prstGeom prst="rect">
@@ -23758,7 +22012,7 @@
         </p:nvSpPr>
         <p:spPr>
           <a:xfrm>
-            <a:off x="304799" y="247415"/>
+            <a:off x="729983" y="1356447"/>
             <a:ext cx="10689516" cy="960419"/>
           </a:xfrm>
           <a:prstGeom prst="roundRect">
@@ -23818,146 +22072,6 @@
           </a:p>
         </p:txBody>
       </p:sp>
-      <p:sp>
-        <p:nvSpPr>
-          <p:cNvPr id="5" name="Rounded Rectangle 4">
-            <a:extLst>
-              <a:ext uri="{FF2B5EF4-FFF2-40B4-BE49-F238E27FC236}">
-                <a16:creationId xmlns:a16="http://schemas.microsoft.com/office/drawing/2014/main" id="{7DAE0040-8865-5A0D-0C96-888FEAD0EBCA}"/>
-              </a:ext>
-            </a:extLst>
-          </p:cNvPr>
-          <p:cNvSpPr/>
-          <p:nvPr/>
-        </p:nvSpPr>
-        <p:spPr>
-          <a:xfrm>
-            <a:off x="342080" y="1568064"/>
-            <a:ext cx="2852941" cy="1067560"/>
-          </a:xfrm>
-          <a:prstGeom prst="roundRect">
-            <a:avLst/>
-          </a:prstGeom>
-        </p:spPr>
-        <p:style>
-          <a:lnRef idx="2">
-            <a:schemeClr val="accent1">
-              <a:shade val="15000"/>
-            </a:schemeClr>
-          </a:lnRef>
-          <a:fillRef idx="1">
-            <a:schemeClr val="accent1"/>
-          </a:fillRef>
-          <a:effectRef idx="0">
-            <a:schemeClr val="accent1"/>
-          </a:effectRef>
-          <a:fontRef idx="minor">
-            <a:schemeClr val="lt1"/>
-          </a:fontRef>
-        </p:style>
-        <p:txBody>
-          <a:bodyPr rtlCol="0" anchor="ctr"/>
-          <a:lstStyle/>
-          <a:p>
-            <a:pPr algn="ctr"/>
-            <a:r>
-              <a:rPr lang="en-BR" dirty="0"/>
-              <a:t>Quando criamos um novo User, ele vem sem permissões</a:t>
-            </a:r>
-          </a:p>
-        </p:txBody>
-      </p:sp>
-      <p:sp>
-        <p:nvSpPr>
-          <p:cNvPr id="6" name="Rounded Rectangle 5">
-            <a:extLst>
-              <a:ext uri="{FF2B5EF4-FFF2-40B4-BE49-F238E27FC236}">
-                <a16:creationId xmlns:a16="http://schemas.microsoft.com/office/drawing/2014/main" id="{5655F32E-F582-546B-70D6-3625A79DA8D1}"/>
-              </a:ext>
-            </a:extLst>
-          </p:cNvPr>
-          <p:cNvSpPr/>
-          <p:nvPr/>
-        </p:nvSpPr>
-        <p:spPr>
-          <a:xfrm>
-            <a:off x="8271413" y="1568064"/>
-            <a:ext cx="3578507" cy="1386490"/>
-          </a:xfrm>
-          <a:prstGeom prst="roundRect">
-            <a:avLst/>
-          </a:prstGeom>
-        </p:spPr>
-        <p:style>
-          <a:lnRef idx="2">
-            <a:schemeClr val="accent1">
-              <a:shade val="15000"/>
-            </a:schemeClr>
-          </a:lnRef>
-          <a:fillRef idx="1">
-            <a:schemeClr val="accent1"/>
-          </a:fillRef>
-          <a:effectRef idx="0">
-            <a:schemeClr val="accent1"/>
-          </a:effectRef>
-          <a:fontRef idx="minor">
-            <a:schemeClr val="lt1"/>
-          </a:fontRef>
-        </p:style>
-        <p:txBody>
-          <a:bodyPr rtlCol="0" anchor="ctr"/>
-          <a:lstStyle/>
-          <a:p>
-            <a:pPr algn="ctr"/>
-            <a:r>
-              <a:rPr lang="en-BR" dirty="0"/>
-              <a:t>Access key ID e secret access keys (acesso programático) DIFERENTES DE username e password (console)</a:t>
-            </a:r>
-          </a:p>
-        </p:txBody>
-      </p:sp>
-      <p:cxnSp>
-        <p:nvCxnSpPr>
-          <p:cNvPr id="8" name="Straight Arrow Connector 7">
-            <a:extLst>
-              <a:ext uri="{FF2B5EF4-FFF2-40B4-BE49-F238E27FC236}">
-                <a16:creationId xmlns:a16="http://schemas.microsoft.com/office/drawing/2014/main" id="{5E668978-131B-3230-4741-210DD4B90566}"/>
-              </a:ext>
-            </a:extLst>
-          </p:cNvPr>
-          <p:cNvCxnSpPr>
-            <a:cxnSpLocks/>
-            <a:endCxn id="5" idx="2"/>
-          </p:cNvCxnSpPr>
-          <p:nvPr/>
-        </p:nvCxnSpPr>
-        <p:spPr>
-          <a:xfrm flipH="1" flipV="1">
-            <a:off x="1768551" y="2635624"/>
-            <a:ext cx="3706887" cy="1159368"/>
-          </a:xfrm>
-          <a:prstGeom prst="straightConnector1">
-            <a:avLst/>
-          </a:prstGeom>
-          <a:ln>
-            <a:tailEnd type="triangle"/>
-          </a:ln>
-        </p:spPr>
-        <p:style>
-          <a:lnRef idx="2">
-            <a:schemeClr val="accent2"/>
-          </a:lnRef>
-          <a:fillRef idx="0">
-            <a:schemeClr val="accent2"/>
-          </a:fillRef>
-          <a:effectRef idx="1">
-            <a:schemeClr val="accent2"/>
-          </a:effectRef>
-          <a:fontRef idx="minor">
-            <a:schemeClr val="tx1"/>
-          </a:fontRef>
-        </p:style>
-      </p:cxnSp>
       <p:cxnSp>
         <p:nvCxnSpPr>
           <p:cNvPr id="14" name="Straight Arrow Connector 13">
@@ -23975,51 +22089,9 @@
           <p:nvPr/>
         </p:nvCxnSpPr>
         <p:spPr>
-          <a:xfrm flipH="1" flipV="1">
-            <a:off x="5649557" y="1207834"/>
-            <a:ext cx="251066" cy="2161974"/>
-          </a:xfrm>
-          <a:prstGeom prst="straightConnector1">
-            <a:avLst/>
-          </a:prstGeom>
-          <a:ln>
-            <a:tailEnd type="triangle"/>
-          </a:ln>
-        </p:spPr>
-        <p:style>
-          <a:lnRef idx="2">
-            <a:schemeClr val="accent2"/>
-          </a:lnRef>
-          <a:fillRef idx="0">
-            <a:schemeClr val="accent2"/>
-          </a:fillRef>
-          <a:effectRef idx="1">
-            <a:schemeClr val="accent2"/>
-          </a:effectRef>
-          <a:fontRef idx="minor">
-            <a:schemeClr val="tx1"/>
-          </a:fontRef>
-        </p:style>
-      </p:cxnSp>
-      <p:cxnSp>
-        <p:nvCxnSpPr>
-          <p:cNvPr id="18" name="Straight Arrow Connector 17">
-            <a:extLst>
-              <a:ext uri="{FF2B5EF4-FFF2-40B4-BE49-F238E27FC236}">
-                <a16:creationId xmlns:a16="http://schemas.microsoft.com/office/drawing/2014/main" id="{9D15D469-FB36-2C03-2402-D663D531F8D1}"/>
-              </a:ext>
-            </a:extLst>
-          </p:cNvPr>
-          <p:cNvCxnSpPr>
-            <a:stCxn id="1026" idx="3"/>
-            <a:endCxn id="6" idx="1"/>
-          </p:cNvCxnSpPr>
-          <p:nvPr/>
-        </p:nvCxnSpPr>
-        <p:spPr>
           <a:xfrm flipV="1">
-            <a:off x="6325807" y="2261309"/>
-            <a:ext cx="1945606" cy="1533684"/>
+            <a:off x="6052544" y="2316866"/>
+            <a:ext cx="22197" cy="1460715"/>
           </a:xfrm>
           <a:prstGeom prst="straightConnector1">
             <a:avLst/>
@@ -24056,7 +22128,7 @@
 </p:sld>
 </file>
 
-<file path=ppt/slides/slide9.xml><?xml version="1.0" encoding="utf-8"?>
+<file path=ppt/slides/slide7.xml><?xml version="1.0" encoding="utf-8"?>
 <p:sld xmlns:a="http://schemas.openxmlformats.org/drawingml/2006/main" xmlns:r="http://schemas.openxmlformats.org/officeDocument/2006/relationships" xmlns:p="http://schemas.openxmlformats.org/presentationml/2006/main">
   <p:cSld>
     <p:spTree>
@@ -24091,8 +22163,8 @@
         </p:nvSpPr>
         <p:spPr>
           <a:xfrm>
-            <a:off x="2199041" y="1080632"/>
-            <a:ext cx="7493599" cy="887021"/>
+            <a:off x="1478934" y="910341"/>
+            <a:ext cx="8847438" cy="688979"/>
           </a:xfrm>
         </p:spPr>
         <p:txBody>
@@ -24101,15 +22173,11 @@
           </a:bodyPr>
           <a:lstStyle/>
           <a:p>
-            <a:r>
-              <a:rPr lang="en-BR" sz="2000" dirty="0"/>
-              <a:t>IAM: Identity Access Management</a:t>
-            </a:r>
             <a:br>
               <a:rPr lang="en-BR" sz="2000" dirty="0"/>
             </a:br>
             <a:r>
-              <a:rPr lang="en-BR" sz="2000" dirty="0"/>
+              <a:rPr lang="en-BR" sz="2000" b="1" dirty="0"/>
               <a:t>Policy Documents: </a:t>
             </a:r>
             <a:r>
@@ -24142,8 +22210,8 @@
         </p:blipFill>
         <p:spPr>
           <a:xfrm>
-            <a:off x="2355027" y="3651350"/>
-            <a:ext cx="7154733" cy="2545742"/>
+            <a:off x="2250752" y="3429000"/>
+            <a:ext cx="7690496" cy="2736373"/>
           </a:xfrm>
           <a:prstGeom prst="rect">
             <a:avLst/>
@@ -24164,7 +22232,7 @@
         </p:nvSpPr>
         <p:spPr>
           <a:xfrm>
-            <a:off x="2323652" y="2560320"/>
+            <a:off x="1478934" y="2387482"/>
             <a:ext cx="9234131" cy="646331"/>
           </a:xfrm>
           <a:prstGeom prst="rect">
@@ -24183,15 +22251,15 @@
               <a:buChar char="-"/>
             </a:pPr>
             <a:r>
-              <a:rPr lang="en-BR" dirty="0"/>
+              <a:rPr lang="en-BR"/>
               <a:t>Estrututura básica de uma </a:t>
             </a:r>
             <a:r>
-              <a:rPr lang="en-BR" b="1" dirty="0"/>
+              <a:rPr lang="en-BR" b="1"/>
               <a:t>política</a:t>
             </a:r>
             <a:r>
-              <a:rPr lang="en-BR" dirty="0"/>
+              <a:rPr lang="en-BR"/>
               <a:t>: efeito, ação e recurso (mais itens no próximo slide)</a:t>
             </a:r>
           </a:p>
@@ -24201,16 +22269,955 @@
               <a:buChar char="-"/>
             </a:pPr>
             <a:r>
-              <a:rPr lang="en-BR" dirty="0"/>
+              <a:rPr lang="en-BR"/>
               <a:t>Uma política pode ser do tipo identity based, resource based entre outros</a:t>
             </a:r>
+            <a:endParaRPr lang="en-BR" dirty="0"/>
           </a:p>
         </p:txBody>
       </p:sp>
+      <p:pic>
+        <p:nvPicPr>
+          <p:cNvPr id="5" name="Picture 2" descr="AWS Cloud Resource | IAM Policy">
+            <a:extLst>
+              <a:ext uri="{FF2B5EF4-FFF2-40B4-BE49-F238E27FC236}">
+                <a16:creationId xmlns:a16="http://schemas.microsoft.com/office/drawing/2014/main" id="{87D5A990-9A3C-F681-A5FC-3286FE6637A0}"/>
+              </a:ext>
+            </a:extLst>
+          </p:cNvPr>
+          <p:cNvPicPr>
+            <a:picLocks noChangeAspect="1" noChangeArrowheads="1"/>
+          </p:cNvPicPr>
+          <p:nvPr/>
+        </p:nvPicPr>
+        <p:blipFill>
+          <a:blip r:embed="rId3">
+            <a:extLst>
+              <a:ext uri="{28A0092B-C50C-407E-A947-70E740481C1C}">
+                <a14:useLocalDpi xmlns:a14="http://schemas.microsoft.com/office/drawing/2010/main" val="0"/>
+              </a:ext>
+            </a:extLst>
+          </a:blip>
+          <a:srcRect/>
+          <a:stretch>
+            <a:fillRect/>
+          </a:stretch>
+        </p:blipFill>
+        <p:spPr bwMode="auto">
+          <a:xfrm>
+            <a:off x="11078224" y="235877"/>
+            <a:ext cx="838181" cy="838181"/>
+          </a:xfrm>
+          <a:prstGeom prst="rect">
+            <a:avLst/>
+          </a:prstGeom>
+          <a:noFill/>
+          <a:extLst>
+            <a:ext uri="{909E8E84-426E-40DD-AFC4-6F175D3DCCD1}">
+              <a14:hiddenFill xmlns:a14="http://schemas.microsoft.com/office/drawing/2010/main">
+                <a:solidFill>
+                  <a:srgbClr val="FFFFFF"/>
+                </a:solidFill>
+              </a14:hiddenFill>
+            </a:ext>
+          </a:extLst>
+        </p:spPr>
+      </p:pic>
     </p:spTree>
     <p:extLst>
       <p:ext uri="{BB962C8B-B14F-4D97-AF65-F5344CB8AC3E}">
         <p14:creationId xmlns:p14="http://schemas.microsoft.com/office/powerpoint/2010/main" val="1458950268"/>
+      </p:ext>
+    </p:extLst>
+  </p:cSld>
+  <p:clrMapOvr>
+    <a:masterClrMapping/>
+  </p:clrMapOvr>
+</p:sld>
+</file>
+
+<file path=ppt/slides/slide8.xml><?xml version="1.0" encoding="utf-8"?>
+<p:sld xmlns:a="http://schemas.openxmlformats.org/drawingml/2006/main" xmlns:r="http://schemas.openxmlformats.org/officeDocument/2006/relationships" xmlns:p="http://schemas.openxmlformats.org/presentationml/2006/main">
+  <p:cSld>
+    <p:spTree>
+      <p:nvGrpSpPr>
+        <p:cNvPr id="1" name=""/>
+        <p:cNvGrpSpPr/>
+        <p:nvPr/>
+      </p:nvGrpSpPr>
+      <p:grpSpPr>
+        <a:xfrm>
+          <a:off x="0" y="0"/>
+          <a:ext cx="0" cy="0"/>
+          <a:chOff x="0" y="0"/>
+          <a:chExt cx="0" cy="0"/>
+        </a:xfrm>
+      </p:grpSpPr>
+      <p:sp>
+        <p:nvSpPr>
+          <p:cNvPr id="2" name="Title 1">
+            <a:extLst>
+              <a:ext uri="{FF2B5EF4-FFF2-40B4-BE49-F238E27FC236}">
+                <a16:creationId xmlns:a16="http://schemas.microsoft.com/office/drawing/2014/main" id="{BA741BC6-744E-7992-B0F0-AB1FE5463C39}"/>
+              </a:ext>
+            </a:extLst>
+          </p:cNvPr>
+          <p:cNvSpPr>
+            <a:spLocks noGrp="1"/>
+          </p:cNvSpPr>
+          <p:nvPr>
+            <p:ph type="ctrTitle"/>
+          </p:nvPr>
+        </p:nvSpPr>
+        <p:spPr>
+          <a:xfrm>
+            <a:off x="2323448" y="483086"/>
+            <a:ext cx="6956855" cy="651934"/>
+          </a:xfrm>
+        </p:spPr>
+        <p:txBody>
+          <a:bodyPr>
+            <a:normAutofit/>
+          </a:bodyPr>
+          <a:lstStyle/>
+          <a:p>
+            <a:r>
+              <a:rPr lang="en-BR" sz="2000" b="1" dirty="0"/>
+              <a:t>IAM: Identity Access Management</a:t>
+            </a:r>
+            <a:br>
+              <a:rPr lang="en-BR" sz="2000" b="1" dirty="0"/>
+            </a:br>
+            <a:endParaRPr lang="en-BR" sz="2000" b="1" dirty="0"/>
+          </a:p>
+        </p:txBody>
+      </p:sp>
+      <p:sp>
+        <p:nvSpPr>
+          <p:cNvPr id="4" name="TextBox 3">
+            <a:extLst>
+              <a:ext uri="{FF2B5EF4-FFF2-40B4-BE49-F238E27FC236}">
+                <a16:creationId xmlns:a16="http://schemas.microsoft.com/office/drawing/2014/main" id="{E0A560F6-07C1-E681-AC8E-05F3244D6E06}"/>
+              </a:ext>
+            </a:extLst>
+          </p:cNvPr>
+          <p:cNvSpPr txBox="1"/>
+          <p:nvPr/>
+        </p:nvSpPr>
+        <p:spPr>
+          <a:xfrm>
+            <a:off x="3548094" y="1238134"/>
+            <a:ext cx="4757777" cy="369332"/>
+          </a:xfrm>
+          <a:prstGeom prst="rect">
+            <a:avLst/>
+          </a:prstGeom>
+          <a:noFill/>
+        </p:spPr>
+        <p:txBody>
+          <a:bodyPr wrap="none" rtlCol="0">
+            <a:spAutoFit/>
+          </a:bodyPr>
+          <a:lstStyle/>
+          <a:p>
+            <a:pPr marL="285750" indent="-285750">
+              <a:buFontTx/>
+              <a:buChar char="-"/>
+            </a:pPr>
+            <a:r>
+              <a:rPr lang="en-BR" dirty="0"/>
+              <a:t>Estrututura básica de uma </a:t>
+            </a:r>
+            <a:r>
+              <a:rPr lang="en-BR" b="1" dirty="0"/>
+              <a:t>política (policy)</a:t>
+            </a:r>
+            <a:endParaRPr lang="en-BR" dirty="0"/>
+          </a:p>
+        </p:txBody>
+      </p:sp>
+      <p:pic>
+        <p:nvPicPr>
+          <p:cNvPr id="5" name="Picture 4">
+            <a:extLst>
+              <a:ext uri="{FF2B5EF4-FFF2-40B4-BE49-F238E27FC236}">
+                <a16:creationId xmlns:a16="http://schemas.microsoft.com/office/drawing/2014/main" id="{13B5A30C-BF88-BD81-0051-AD1CBFD529CC}"/>
+              </a:ext>
+            </a:extLst>
+          </p:cNvPr>
+          <p:cNvPicPr>
+            <a:picLocks noChangeAspect="1"/>
+          </p:cNvPicPr>
+          <p:nvPr/>
+        </p:nvPicPr>
+        <p:blipFill>
+          <a:blip r:embed="rId2"/>
+          <a:stretch>
+            <a:fillRect/>
+          </a:stretch>
+        </p:blipFill>
+        <p:spPr>
+          <a:xfrm>
+            <a:off x="2617572" y="1813694"/>
+            <a:ext cx="6368609" cy="4664333"/>
+          </a:xfrm>
+          <a:prstGeom prst="rect">
+            <a:avLst/>
+          </a:prstGeom>
+        </p:spPr>
+      </p:pic>
+    </p:spTree>
+    <p:extLst>
+      <p:ext uri="{BB962C8B-B14F-4D97-AF65-F5344CB8AC3E}">
+        <p14:creationId xmlns:p14="http://schemas.microsoft.com/office/powerpoint/2010/main" val="1628246712"/>
+      </p:ext>
+    </p:extLst>
+  </p:cSld>
+  <p:clrMapOvr>
+    <a:masterClrMapping/>
+  </p:clrMapOvr>
+</p:sld>
+</file>
+
+<file path=ppt/slides/slide9.xml><?xml version="1.0" encoding="utf-8"?>
+<p:sld xmlns:a="http://schemas.openxmlformats.org/drawingml/2006/main" xmlns:r="http://schemas.openxmlformats.org/officeDocument/2006/relationships" xmlns:p="http://schemas.openxmlformats.org/presentationml/2006/main">
+  <p:cSld>
+    <p:bg>
+      <p:bgPr>
+        <a:solidFill>
+          <a:schemeClr val="bg1"/>
+        </a:solidFill>
+        <a:effectLst/>
+      </p:bgPr>
+    </p:bg>
+    <p:spTree>
+      <p:nvGrpSpPr>
+        <p:cNvPr id="1" name=""/>
+        <p:cNvGrpSpPr/>
+        <p:nvPr/>
+      </p:nvGrpSpPr>
+      <p:grpSpPr>
+        <a:xfrm>
+          <a:off x="0" y="0"/>
+          <a:ext cx="0" cy="0"/>
+          <a:chOff x="0" y="0"/>
+          <a:chExt cx="0" cy="0"/>
+        </a:xfrm>
+      </p:grpSpPr>
+      <p:sp useBgFill="1">
+        <p:nvSpPr>
+          <p:cNvPr id="29" name="Rectangle 28">
+            <a:extLst>
+              <a:ext uri="{FF2B5EF4-FFF2-40B4-BE49-F238E27FC236}">
+                <a16:creationId xmlns:a16="http://schemas.microsoft.com/office/drawing/2014/main" id="{53B021B3-DE93-4AB7-8A18-CF5F1CED88B8}"/>
+              </a:ext>
+              <a:ext uri="{C183D7F6-B498-43B3-948B-1728B52AA6E4}">
+                <adec:decorative xmlns:adec="http://schemas.microsoft.com/office/drawing/2017/decorative" val="1"/>
+              </a:ext>
+            </a:extLst>
+          </p:cNvPr>
+          <p:cNvSpPr>
+            <a:spLocks noGrp="1" noRot="1" noChangeAspect="1" noMove="1" noResize="1" noEditPoints="1" noAdjustHandles="1" noChangeArrowheads="1" noChangeShapeType="1" noTextEdit="1"/>
+          </p:cNvSpPr>
+          <p:nvPr>
+            <p:extLst>
+              <p:ext uri="{386F3935-93C4-4BCD-93E2-E3B085C9AB24}">
+                <p16:designElem xmlns:p16="http://schemas.microsoft.com/office/powerpoint/2015/main" val="1"/>
+              </p:ext>
+            </p:extLst>
+          </p:nvPr>
+        </p:nvSpPr>
+        <p:spPr>
+          <a:xfrm>
+            <a:off x="0" y="0"/>
+            <a:ext cx="12192000" cy="6858000"/>
+          </a:xfrm>
+          <a:prstGeom prst="rect">
+            <a:avLst/>
+          </a:prstGeom>
+          <a:ln>
+            <a:noFill/>
+          </a:ln>
+        </p:spPr>
+        <p:style>
+          <a:lnRef idx="2">
+            <a:schemeClr val="accent1">
+              <a:shade val="50000"/>
+            </a:schemeClr>
+          </a:lnRef>
+          <a:fillRef idx="1">
+            <a:schemeClr val="accent1"/>
+          </a:fillRef>
+          <a:effectRef idx="0">
+            <a:schemeClr val="accent1"/>
+          </a:effectRef>
+          <a:fontRef idx="minor">
+            <a:schemeClr val="lt1"/>
+          </a:fontRef>
+        </p:style>
+        <p:txBody>
+          <a:bodyPr rtlCol="0" anchor="ctr"/>
+          <a:lstStyle/>
+          <a:p>
+            <a:pPr algn="ctr"/>
+            <a:endParaRPr lang="en-US"/>
+          </a:p>
+        </p:txBody>
+      </p:sp>
+      <p:sp>
+        <p:nvSpPr>
+          <p:cNvPr id="2" name="Title 1">
+            <a:extLst>
+              <a:ext uri="{FF2B5EF4-FFF2-40B4-BE49-F238E27FC236}">
+                <a16:creationId xmlns:a16="http://schemas.microsoft.com/office/drawing/2014/main" id="{BA741BC6-744E-7992-B0F0-AB1FE5463C39}"/>
+              </a:ext>
+            </a:extLst>
+          </p:cNvPr>
+          <p:cNvSpPr>
+            <a:spLocks noGrp="1"/>
+          </p:cNvSpPr>
+          <p:nvPr>
+            <p:ph type="ctrTitle"/>
+          </p:nvPr>
+        </p:nvSpPr>
+        <p:spPr>
+          <a:xfrm>
+            <a:off x="841248" y="256032"/>
+            <a:ext cx="10506456" cy="1014984"/>
+          </a:xfrm>
+        </p:spPr>
+        <p:txBody>
+          <a:bodyPr vert="horz" lIns="91440" tIns="45720" rIns="91440" bIns="45720" rtlCol="0" anchor="b">
+            <a:normAutofit/>
+          </a:bodyPr>
+          <a:lstStyle/>
+          <a:p>
+            <a:pPr algn="l"/>
+            <a:r>
+              <a:rPr lang="en-US" sz="3100" kern="1200">
+                <a:solidFill>
+                  <a:schemeClr val="tx1"/>
+                </a:solidFill>
+                <a:latin typeface="+mj-lt"/>
+                <a:ea typeface="+mj-ea"/>
+                <a:cs typeface="+mj-cs"/>
+              </a:rPr>
+              <a:t>IAM: Identity Access Management</a:t>
+            </a:r>
+            <a:br>
+              <a:rPr lang="en-US" sz="3100" kern="1200">
+                <a:solidFill>
+                  <a:schemeClr val="tx1"/>
+                </a:solidFill>
+                <a:latin typeface="+mj-lt"/>
+                <a:ea typeface="+mj-ea"/>
+                <a:cs typeface="+mj-cs"/>
+              </a:rPr>
+            </a:br>
+            <a:r>
+              <a:rPr lang="en-US" sz="3100" kern="1200">
+                <a:solidFill>
+                  <a:schemeClr val="tx1"/>
+                </a:solidFill>
+                <a:latin typeface="+mj-lt"/>
+                <a:ea typeface="+mj-ea"/>
+                <a:cs typeface="+mj-cs"/>
+              </a:rPr>
+              <a:t>Policy Documents:</a:t>
+            </a:r>
+          </a:p>
+        </p:txBody>
+      </p:sp>
+      <p:sp>
+        <p:nvSpPr>
+          <p:cNvPr id="30" name="Rectangle 29">
+            <a:extLst>
+              <a:ext uri="{FF2B5EF4-FFF2-40B4-BE49-F238E27FC236}">
+                <a16:creationId xmlns:a16="http://schemas.microsoft.com/office/drawing/2014/main" id="{52D502E5-F6B4-4D58-B4AE-FC466FF15EE8}"/>
+              </a:ext>
+              <a:ext uri="{C183D7F6-B498-43B3-948B-1728B52AA6E4}">
+                <adec:decorative xmlns:adec="http://schemas.microsoft.com/office/drawing/2017/decorative" val="1"/>
+              </a:ext>
+            </a:extLst>
+          </p:cNvPr>
+          <p:cNvSpPr>
+            <a:spLocks noGrp="1" noRot="1" noChangeAspect="1" noMove="1" noResize="1" noEditPoints="1" noAdjustHandles="1" noChangeArrowheads="1" noChangeShapeType="1" noTextEdit="1"/>
+          </p:cNvSpPr>
+          <p:nvPr>
+            <p:extLst>
+              <p:ext uri="{386F3935-93C4-4BCD-93E2-E3B085C9AB24}">
+                <p16:designElem xmlns:p16="http://schemas.microsoft.com/office/powerpoint/2015/main" val="1"/>
+              </p:ext>
+            </p:extLst>
+          </p:nvPr>
+        </p:nvSpPr>
+        <p:spPr>
+          <a:xfrm>
+            <a:off x="865953" y="1634502"/>
+            <a:ext cx="10451592" cy="18288"/>
+          </a:xfrm>
+          <a:prstGeom prst="rect">
+            <a:avLst/>
+          </a:prstGeom>
+          <a:solidFill>
+            <a:srgbClr val="D5D5D5"/>
+          </a:solidFill>
+          <a:ln w="3175">
+            <a:noFill/>
+          </a:ln>
+          <a:effectLst/>
+        </p:spPr>
+        <p:style>
+          <a:lnRef idx="2">
+            <a:schemeClr val="accent1">
+              <a:shade val="50000"/>
+            </a:schemeClr>
+          </a:lnRef>
+          <a:fillRef idx="1">
+            <a:schemeClr val="accent1"/>
+          </a:fillRef>
+          <a:effectRef idx="0">
+            <a:schemeClr val="accent1"/>
+          </a:effectRef>
+          <a:fontRef idx="minor">
+            <a:schemeClr val="lt1"/>
+          </a:fontRef>
+        </p:style>
+        <p:txBody>
+          <a:bodyPr rtlCol="0" anchor="ctr"/>
+          <a:lstStyle/>
+          <a:p>
+            <a:pPr algn="ctr"/>
+            <a:endParaRPr lang="en-US">
+              <a:solidFill>
+                <a:prstClr val="white"/>
+              </a:solidFill>
+              <a:latin typeface="Calibri" panose="020F0502020204030204"/>
+            </a:endParaRPr>
+          </a:p>
+        </p:txBody>
+      </p:sp>
+      <p:sp>
+        <p:nvSpPr>
+          <p:cNvPr id="31" name="Rectangle 30">
+            <a:extLst>
+              <a:ext uri="{FF2B5EF4-FFF2-40B4-BE49-F238E27FC236}">
+                <a16:creationId xmlns:a16="http://schemas.microsoft.com/office/drawing/2014/main" id="{9DECDBF4-02B6-4BB4-B65B-B8107AD6A9E8}"/>
+              </a:ext>
+              <a:ext uri="{C183D7F6-B498-43B3-948B-1728B52AA6E4}">
+                <adec:decorative xmlns:adec="http://schemas.microsoft.com/office/drawing/2017/decorative" val="1"/>
+              </a:ext>
+            </a:extLst>
+          </p:cNvPr>
+          <p:cNvSpPr>
+            <a:spLocks noGrp="1" noRot="1" noChangeAspect="1" noMove="1" noResize="1" noEditPoints="1" noAdjustHandles="1" noChangeArrowheads="1" noChangeShapeType="1" noTextEdit="1"/>
+          </p:cNvSpPr>
+          <p:nvPr>
+            <p:extLst>
+              <p:ext uri="{386F3935-93C4-4BCD-93E2-E3B085C9AB24}">
+                <p16:designElem xmlns:p16="http://schemas.microsoft.com/office/powerpoint/2015/main" val="1"/>
+              </p:ext>
+            </p:extLst>
+          </p:nvPr>
+        </p:nvSpPr>
+        <p:spPr>
+          <a:xfrm flipV="1">
+            <a:off x="841248" y="1538176"/>
+            <a:ext cx="1873457" cy="109814"/>
+          </a:xfrm>
+          <a:prstGeom prst="rect">
+            <a:avLst/>
+          </a:prstGeom>
+          <a:solidFill>
+            <a:schemeClr val="accent2"/>
+          </a:solidFill>
+          <a:ln>
+            <a:noFill/>
+          </a:ln>
+        </p:spPr>
+        <p:style>
+          <a:lnRef idx="2">
+            <a:schemeClr val="accent1">
+              <a:shade val="50000"/>
+            </a:schemeClr>
+          </a:lnRef>
+          <a:fillRef idx="1">
+            <a:schemeClr val="accent1"/>
+          </a:fillRef>
+          <a:effectRef idx="0">
+            <a:schemeClr val="accent1"/>
+          </a:effectRef>
+          <a:fontRef idx="minor">
+            <a:schemeClr val="lt1"/>
+          </a:fontRef>
+        </p:style>
+        <p:txBody>
+          <a:bodyPr rtlCol="0" anchor="ctr"/>
+          <a:lstStyle/>
+          <a:p>
+            <a:pPr algn="ctr"/>
+            <a:endParaRPr lang="en-US">
+              <a:solidFill>
+                <a:prstClr val="white"/>
+              </a:solidFill>
+              <a:latin typeface="Calibri" panose="020F0502020204030204"/>
+            </a:endParaRPr>
+          </a:p>
+        </p:txBody>
+      </p:sp>
+      <p:pic>
+        <p:nvPicPr>
+          <p:cNvPr id="5" name="Picture 4" descr="A red square with a white line on it&#10;&#10;Description automatically generated">
+            <a:extLst>
+              <a:ext uri="{FF2B5EF4-FFF2-40B4-BE49-F238E27FC236}">
+                <a16:creationId xmlns:a16="http://schemas.microsoft.com/office/drawing/2014/main" id="{38DDF2EB-C63B-7284-7F86-33B82E3D9E82}"/>
+              </a:ext>
+            </a:extLst>
+          </p:cNvPr>
+          <p:cNvPicPr>
+            <a:picLocks noChangeAspect="1"/>
+          </p:cNvPicPr>
+          <p:nvPr/>
+        </p:nvPicPr>
+        <p:blipFill>
+          <a:blip r:embed="rId2"/>
+          <a:stretch>
+            <a:fillRect/>
+          </a:stretch>
+        </p:blipFill>
+        <p:spPr>
+          <a:xfrm>
+            <a:off x="5325439" y="2030990"/>
+            <a:ext cx="972050" cy="965655"/>
+          </a:xfrm>
+          <a:prstGeom prst="rect">
+            <a:avLst/>
+          </a:prstGeom>
+        </p:spPr>
+      </p:pic>
+      <p:sp>
+        <p:nvSpPr>
+          <p:cNvPr id="6" name="Rounded Rectangle 5">
+            <a:extLst>
+              <a:ext uri="{FF2B5EF4-FFF2-40B4-BE49-F238E27FC236}">
+                <a16:creationId xmlns:a16="http://schemas.microsoft.com/office/drawing/2014/main" id="{F7748687-CA60-F5D3-F4DD-8B31589C700E}"/>
+              </a:ext>
+            </a:extLst>
+          </p:cNvPr>
+          <p:cNvSpPr/>
+          <p:nvPr/>
+        </p:nvSpPr>
+        <p:spPr>
+          <a:xfrm>
+            <a:off x="107779" y="2049666"/>
+            <a:ext cx="4636546" cy="928303"/>
+          </a:xfrm>
+          <a:prstGeom prst="roundRect">
+            <a:avLst/>
+          </a:prstGeom>
+        </p:spPr>
+        <p:style>
+          <a:lnRef idx="2">
+            <a:schemeClr val="accent1">
+              <a:shade val="15000"/>
+            </a:schemeClr>
+          </a:lnRef>
+          <a:fillRef idx="1">
+            <a:schemeClr val="accent1"/>
+          </a:fillRef>
+          <a:effectRef idx="0">
+            <a:schemeClr val="accent1"/>
+          </a:effectRef>
+          <a:fontRef idx="minor">
+            <a:schemeClr val="lt1"/>
+          </a:fontRef>
+        </p:style>
+        <p:txBody>
+          <a:bodyPr rtlCol="0" anchor="ctr"/>
+          <a:lstStyle/>
+          <a:p>
+            <a:pPr algn="ctr" defTabSz="877824">
+              <a:spcAft>
+                <a:spcPts val="600"/>
+              </a:spcAft>
+            </a:pPr>
+            <a:r>
+              <a:rPr lang="en-BR" sz="1728" kern="1200" dirty="0">
+                <a:solidFill>
+                  <a:schemeClr val="bg1"/>
+                </a:solidFill>
+                <a:latin typeface="+mn-lt"/>
+                <a:ea typeface="+mn-ea"/>
+                <a:cs typeface="+mn-cs"/>
+              </a:rPr>
+              <a:t>Identity based:</a:t>
+            </a:r>
+          </a:p>
+          <a:p>
+            <a:pPr algn="ctr" defTabSz="877824">
+              <a:spcAft>
+                <a:spcPts val="600"/>
+              </a:spcAft>
+            </a:pPr>
+            <a:r>
+              <a:rPr lang="en-US" sz="1728" kern="1200" dirty="0">
+                <a:solidFill>
+                  <a:schemeClr val="bg1"/>
+                </a:solidFill>
+                <a:latin typeface="+mn-lt"/>
+                <a:ea typeface="+mn-ea"/>
+                <a:cs typeface="+mn-cs"/>
+              </a:rPr>
+              <a:t>Permissões de U</a:t>
+            </a:r>
+            <a:r>
+              <a:rPr lang="en-BR" sz="1728" kern="1200" dirty="0">
+                <a:solidFill>
+                  <a:schemeClr val="bg1"/>
+                </a:solidFill>
+                <a:latin typeface="+mn-lt"/>
+                <a:ea typeface="+mn-ea"/>
+                <a:cs typeface="+mn-cs"/>
+              </a:rPr>
+              <a:t>ser ou Role (role pode ser resource based)</a:t>
+            </a:r>
+            <a:endParaRPr lang="en-BR" dirty="0">
+              <a:solidFill>
+                <a:schemeClr val="bg1"/>
+              </a:solidFill>
+            </a:endParaRPr>
+          </a:p>
+        </p:txBody>
+      </p:sp>
+      <p:sp>
+        <p:nvSpPr>
+          <p:cNvPr id="7" name="Rounded Rectangle 6">
+            <a:extLst>
+              <a:ext uri="{FF2B5EF4-FFF2-40B4-BE49-F238E27FC236}">
+                <a16:creationId xmlns:a16="http://schemas.microsoft.com/office/drawing/2014/main" id="{8D2DDA3B-F92F-ACB2-3148-72657A0C421A}"/>
+              </a:ext>
+            </a:extLst>
+          </p:cNvPr>
+          <p:cNvSpPr/>
+          <p:nvPr/>
+        </p:nvSpPr>
+        <p:spPr>
+          <a:xfrm>
+            <a:off x="7019585" y="2030989"/>
+            <a:ext cx="4827968" cy="964879"/>
+          </a:xfrm>
+          <a:prstGeom prst="roundRect">
+            <a:avLst/>
+          </a:prstGeom>
+        </p:spPr>
+        <p:style>
+          <a:lnRef idx="2">
+            <a:schemeClr val="accent1">
+              <a:shade val="15000"/>
+            </a:schemeClr>
+          </a:lnRef>
+          <a:fillRef idx="1">
+            <a:schemeClr val="accent1"/>
+          </a:fillRef>
+          <a:effectRef idx="0">
+            <a:schemeClr val="accent1"/>
+          </a:effectRef>
+          <a:fontRef idx="minor">
+            <a:schemeClr val="lt1"/>
+          </a:fontRef>
+        </p:style>
+        <p:txBody>
+          <a:bodyPr rtlCol="0" anchor="ctr"/>
+          <a:lstStyle/>
+          <a:p>
+            <a:pPr algn="ctr" defTabSz="877824">
+              <a:spcAft>
+                <a:spcPts val="600"/>
+              </a:spcAft>
+            </a:pPr>
+            <a:r>
+              <a:rPr lang="en-BR" sz="1728" kern="1200" dirty="0">
+                <a:solidFill>
+                  <a:schemeClr val="bg1"/>
+                </a:solidFill>
+                <a:latin typeface="+mn-lt"/>
+                <a:ea typeface="+mn-ea"/>
+                <a:cs typeface="+mn-cs"/>
+              </a:rPr>
+              <a:t>Resource based: associado a um recurso -&gt; quem pode acessar e quais ações</a:t>
+            </a:r>
+            <a:endParaRPr lang="en-BR" dirty="0">
+              <a:solidFill>
+                <a:schemeClr val="bg1"/>
+              </a:solidFill>
+            </a:endParaRPr>
+          </a:p>
+        </p:txBody>
+      </p:sp>
+      <p:cxnSp>
+        <p:nvCxnSpPr>
+          <p:cNvPr id="9" name="Straight Arrow Connector 8">
+            <a:extLst>
+              <a:ext uri="{FF2B5EF4-FFF2-40B4-BE49-F238E27FC236}">
+                <a16:creationId xmlns:a16="http://schemas.microsoft.com/office/drawing/2014/main" id="{38067A72-0AA5-0340-7A52-44B206BA5C07}"/>
+              </a:ext>
+            </a:extLst>
+          </p:cNvPr>
+          <p:cNvCxnSpPr>
+            <a:cxnSpLocks/>
+            <a:stCxn id="6" idx="3"/>
+            <a:endCxn id="5" idx="1"/>
+          </p:cNvCxnSpPr>
+          <p:nvPr/>
+        </p:nvCxnSpPr>
+        <p:spPr>
+          <a:xfrm>
+            <a:off x="4744325" y="2513818"/>
+            <a:ext cx="581114" cy="0"/>
+          </a:xfrm>
+          <a:prstGeom prst="straightConnector1">
+            <a:avLst/>
+          </a:prstGeom>
+          <a:ln>
+            <a:tailEnd type="triangle"/>
+          </a:ln>
+        </p:spPr>
+        <p:style>
+          <a:lnRef idx="2">
+            <a:schemeClr val="accent1"/>
+          </a:lnRef>
+          <a:fillRef idx="0">
+            <a:schemeClr val="accent1"/>
+          </a:fillRef>
+          <a:effectRef idx="1">
+            <a:schemeClr val="accent1"/>
+          </a:effectRef>
+          <a:fontRef idx="minor">
+            <a:schemeClr val="tx1"/>
+          </a:fontRef>
+        </p:style>
+      </p:cxnSp>
+      <p:cxnSp>
+        <p:nvCxnSpPr>
+          <p:cNvPr id="10" name="Straight Arrow Connector 9">
+            <a:extLst>
+              <a:ext uri="{FF2B5EF4-FFF2-40B4-BE49-F238E27FC236}">
+                <a16:creationId xmlns:a16="http://schemas.microsoft.com/office/drawing/2014/main" id="{A98CF4DC-7620-05A3-CCC7-18B6177D6C8B}"/>
+              </a:ext>
+            </a:extLst>
+          </p:cNvPr>
+          <p:cNvCxnSpPr>
+            <a:cxnSpLocks/>
+            <a:stCxn id="7" idx="1"/>
+            <a:endCxn id="5" idx="3"/>
+          </p:cNvCxnSpPr>
+          <p:nvPr/>
+        </p:nvCxnSpPr>
+        <p:spPr>
+          <a:xfrm flipH="1">
+            <a:off x="6297489" y="2513429"/>
+            <a:ext cx="722096" cy="389"/>
+          </a:xfrm>
+          <a:prstGeom prst="straightConnector1">
+            <a:avLst/>
+          </a:prstGeom>
+          <a:ln>
+            <a:tailEnd type="triangle"/>
+          </a:ln>
+        </p:spPr>
+        <p:style>
+          <a:lnRef idx="2">
+            <a:schemeClr val="accent1"/>
+          </a:lnRef>
+          <a:fillRef idx="0">
+            <a:schemeClr val="accent1"/>
+          </a:fillRef>
+          <a:effectRef idx="1">
+            <a:schemeClr val="accent1"/>
+          </a:effectRef>
+          <a:fontRef idx="minor">
+            <a:schemeClr val="tx1"/>
+          </a:fontRef>
+        </p:style>
+      </p:cxnSp>
+      <p:sp>
+        <p:nvSpPr>
+          <p:cNvPr id="16" name="TextBox 15">
+            <a:extLst>
+              <a:ext uri="{FF2B5EF4-FFF2-40B4-BE49-F238E27FC236}">
+                <a16:creationId xmlns:a16="http://schemas.microsoft.com/office/drawing/2014/main" id="{29923B84-5123-76CC-13E9-7801DB1E4F2C}"/>
+              </a:ext>
+            </a:extLst>
+          </p:cNvPr>
+          <p:cNvSpPr txBox="1"/>
+          <p:nvPr/>
+        </p:nvSpPr>
+        <p:spPr>
+          <a:xfrm>
+            <a:off x="641243" y="6244524"/>
+            <a:ext cx="10515600" cy="357444"/>
+          </a:xfrm>
+          <a:prstGeom prst="rect">
+            <a:avLst/>
+          </a:prstGeom>
+          <a:noFill/>
+        </p:spPr>
+        <p:txBody>
+          <a:bodyPr wrap="none" rtlCol="0">
+            <a:spAutoFit/>
+          </a:bodyPr>
+          <a:lstStyle/>
+          <a:p>
+            <a:pPr defTabSz="877824">
+              <a:spcAft>
+                <a:spcPts val="600"/>
+              </a:spcAft>
+            </a:pPr>
+            <a:r>
+              <a:rPr lang="en-BR" sz="1728" kern="1200" dirty="0">
+                <a:solidFill>
+                  <a:schemeClr val="tx1"/>
+                </a:solidFill>
+                <a:latin typeface="+mn-lt"/>
+                <a:ea typeface="+mn-ea"/>
+                <a:cs typeface="+mn-cs"/>
+              </a:rPr>
+              <a:t>Doc: </a:t>
+            </a:r>
+            <a:r>
+              <a:rPr lang="en-US" sz="1728" kern="1200" dirty="0">
+                <a:solidFill>
+                  <a:schemeClr val="tx1"/>
+                </a:solidFill>
+                <a:latin typeface="+mn-lt"/>
+                <a:ea typeface="+mn-ea"/>
+                <a:cs typeface="+mn-cs"/>
+              </a:rPr>
+              <a:t>https://docs.aws.amazon.com/</a:t>
+            </a:r>
+            <a:r>
+              <a:rPr lang="en-US" sz="1728" kern="1200" dirty="0" err="1">
+                <a:solidFill>
+                  <a:schemeClr val="tx1"/>
+                </a:solidFill>
+                <a:latin typeface="+mn-lt"/>
+                <a:ea typeface="+mn-ea"/>
+                <a:cs typeface="+mn-cs"/>
+              </a:rPr>
+              <a:t>pt_br</a:t>
+            </a:r>
+            <a:r>
+              <a:rPr lang="en-US" sz="1728" kern="1200" dirty="0">
+                <a:solidFill>
+                  <a:schemeClr val="tx1"/>
+                </a:solidFill>
+                <a:latin typeface="+mn-lt"/>
+                <a:ea typeface="+mn-ea"/>
+                <a:cs typeface="+mn-cs"/>
+              </a:rPr>
+              <a:t>/IAM/latest/UserGuide/</a:t>
+            </a:r>
+            <a:r>
+              <a:rPr lang="en-US" sz="1728" kern="1200" dirty="0" err="1">
+                <a:solidFill>
+                  <a:schemeClr val="tx1"/>
+                </a:solidFill>
+                <a:latin typeface="+mn-lt"/>
+                <a:ea typeface="+mn-ea"/>
+                <a:cs typeface="+mn-cs"/>
+              </a:rPr>
+              <a:t>access_policies_identity</a:t>
+            </a:r>
+            <a:r>
+              <a:rPr lang="en-US" sz="1728" kern="1200" dirty="0">
+                <a:solidFill>
+                  <a:schemeClr val="tx1"/>
+                </a:solidFill>
+                <a:latin typeface="+mn-lt"/>
+                <a:ea typeface="+mn-ea"/>
+                <a:cs typeface="+mn-cs"/>
+              </a:rPr>
+              <a:t>-vs-</a:t>
+            </a:r>
+            <a:r>
+              <a:rPr lang="en-US" sz="1728" kern="1200" dirty="0" err="1">
+                <a:solidFill>
+                  <a:schemeClr val="tx1"/>
+                </a:solidFill>
+                <a:latin typeface="+mn-lt"/>
+                <a:ea typeface="+mn-ea"/>
+                <a:cs typeface="+mn-cs"/>
+              </a:rPr>
+              <a:t>resource.html</a:t>
+            </a:r>
+            <a:endParaRPr lang="en-BR" dirty="0"/>
+          </a:p>
+        </p:txBody>
+      </p:sp>
+      <p:pic>
+        <p:nvPicPr>
+          <p:cNvPr id="38" name="Picture 37">
+            <a:extLst>
+              <a:ext uri="{FF2B5EF4-FFF2-40B4-BE49-F238E27FC236}">
+                <a16:creationId xmlns:a16="http://schemas.microsoft.com/office/drawing/2014/main" id="{9E3F1EC9-5988-AE1D-F014-0A7F7D36ABD8}"/>
+              </a:ext>
+            </a:extLst>
+          </p:cNvPr>
+          <p:cNvPicPr>
+            <a:picLocks noChangeAspect="1"/>
+          </p:cNvPicPr>
+          <p:nvPr/>
+        </p:nvPicPr>
+        <p:blipFill>
+          <a:blip r:embed="rId3"/>
+          <a:stretch>
+            <a:fillRect/>
+          </a:stretch>
+        </p:blipFill>
+        <p:spPr>
+          <a:xfrm>
+            <a:off x="188802" y="3208536"/>
+            <a:ext cx="3808268" cy="2658067"/>
+          </a:xfrm>
+          <a:prstGeom prst="rect">
+            <a:avLst/>
+          </a:prstGeom>
+        </p:spPr>
+      </p:pic>
+      <p:pic>
+        <p:nvPicPr>
+          <p:cNvPr id="50" name="Picture 49">
+            <a:extLst>
+              <a:ext uri="{FF2B5EF4-FFF2-40B4-BE49-F238E27FC236}">
+                <a16:creationId xmlns:a16="http://schemas.microsoft.com/office/drawing/2014/main" id="{8C68913C-76AB-2AC6-8380-0B647D27F344}"/>
+              </a:ext>
+            </a:extLst>
+          </p:cNvPr>
+          <p:cNvPicPr>
+            <a:picLocks noChangeAspect="1"/>
+          </p:cNvPicPr>
+          <p:nvPr/>
+        </p:nvPicPr>
+        <p:blipFill>
+          <a:blip r:embed="rId4"/>
+          <a:stretch>
+            <a:fillRect/>
+          </a:stretch>
+        </p:blipFill>
+        <p:spPr>
+          <a:xfrm>
+            <a:off x="7019585" y="3273177"/>
+            <a:ext cx="4827969" cy="2528786"/>
+          </a:xfrm>
+          <a:prstGeom prst="rect">
+            <a:avLst/>
+          </a:prstGeom>
+        </p:spPr>
+      </p:pic>
+    </p:spTree>
+    <p:extLst>
+      <p:ext uri="{BB962C8B-B14F-4D97-AF65-F5344CB8AC3E}">
+        <p14:creationId xmlns:p14="http://schemas.microsoft.com/office/powerpoint/2010/main" val="667213948"/>
       </p:ext>
     </p:extLst>
   </p:cSld>

</xml_diff>